<commit_message>
add figure to figures.pptx (forgotten commit) #1
</commit_message>
<xml_diff>
--- a/tutorial/素材/figures.pptx
+++ b/tutorial/素材/figures.pptx
@@ -5,15 +5,17 @@
     <p:sldMasterId id="2147483648" r:id="rId1"/>
   </p:sldMasterIdLst>
   <p:notesMasterIdLst>
-    <p:notesMasterId r:id="rId8"/>
+    <p:notesMasterId r:id="rId10"/>
   </p:notesMasterIdLst>
   <p:sldIdLst>
-    <p:sldId id="257" r:id="rId2"/>
-    <p:sldId id="256" r:id="rId3"/>
-    <p:sldId id="258" r:id="rId4"/>
-    <p:sldId id="261" r:id="rId5"/>
-    <p:sldId id="260" r:id="rId6"/>
-    <p:sldId id="262" r:id="rId7"/>
+    <p:sldId id="263" r:id="rId2"/>
+    <p:sldId id="264" r:id="rId3"/>
+    <p:sldId id="257" r:id="rId4"/>
+    <p:sldId id="256" r:id="rId5"/>
+    <p:sldId id="258" r:id="rId6"/>
+    <p:sldId id="261" r:id="rId7"/>
+    <p:sldId id="260" r:id="rId8"/>
+    <p:sldId id="262" r:id="rId9"/>
   </p:sldIdLst>
   <p:sldSz cx="9144000" cy="6858000" type="screen4x3"/>
   <p:notesSz cx="6858000" cy="9144000"/>
@@ -198,7 +200,7 @@
             <a:fld id="{B3B782C2-D702-4F12-82BE-63B4C721254B}" type="datetimeFigureOut">
               <a:rPr kumimoji="1" lang="ja-JP" altLang="en-US" smtClean="0"/>
               <a:pPr/>
-              <a:t>2011/10/21</a:t>
+              <a:t>2015/1/5</a:t>
             </a:fld>
             <a:endParaRPr kumimoji="1" lang="ja-JP" altLang="en-US"/>
           </a:p>
@@ -392,13 +394,18 @@
             <a:fld id="{5508C820-4377-4B5D-B5E3-A2FF24BD9C22}" type="slidenum">
               <a:rPr kumimoji="1" lang="ja-JP" altLang="en-US" smtClean="0"/>
               <a:pPr/>
-              <a:t>&lt;#&gt;</a:t>
+              <a:t>‹#›</a:t>
             </a:fld>
             <a:endParaRPr kumimoji="1" lang="ja-JP" altLang="en-US"/>
           </a:p>
         </p:txBody>
       </p:sp>
     </p:spTree>
+    <p:extLst>
+      <p:ext uri="{BB962C8B-B14F-4D97-AF65-F5344CB8AC3E}">
+        <p14:creationId xmlns:p14="http://schemas.microsoft.com/office/powerpoint/2010/main" val="343005506"/>
+      </p:ext>
+    </p:extLst>
   </p:cSld>
   <p:clrMap bg1="lt1" tx1="dk1" bg2="lt2" tx2="dk2" accent1="accent1" accent2="accent2" accent3="accent3" accent4="accent4" accent5="accent5" accent6="accent6" hlink="hlink" folHlink="folHlink"/>
   <p:notesStyle>
@@ -568,7 +575,7 @@
             <a:fld id="{5508C820-4377-4B5D-B5E3-A2FF24BD9C22}" type="slidenum">
               <a:rPr kumimoji="1" lang="ja-JP" altLang="en-US" smtClean="0"/>
               <a:pPr/>
-              <a:t>2</a:t>
+              <a:t>4</a:t>
             </a:fld>
             <a:endParaRPr kumimoji="1" lang="ja-JP" altLang="en-US"/>
           </a:p>
@@ -764,7 +771,7 @@
             <a:fld id="{BD1EE93E-8BFC-4282-90A1-6669D32FBCAB}" type="datetimeFigureOut">
               <a:rPr kumimoji="1" lang="ja-JP" altLang="en-US" smtClean="0"/>
               <a:pPr/>
-              <a:t>2011/10/21</a:t>
+              <a:t>2015/1/5</a:t>
             </a:fld>
             <a:endParaRPr kumimoji="1" lang="ja-JP" altLang="en-US"/>
           </a:p>
@@ -807,7 +814,7 @@
             <a:fld id="{04D974DD-768E-4670-957A-B0B82F33E5D4}" type="slidenum">
               <a:rPr kumimoji="1" lang="ja-JP" altLang="en-US" smtClean="0"/>
               <a:pPr/>
-              <a:t>&lt;#&gt;</a:t>
+              <a:t>‹#›</a:t>
             </a:fld>
             <a:endParaRPr kumimoji="1" lang="ja-JP" altLang="en-US"/>
           </a:p>
@@ -963,7 +970,7 @@
             <a:fld id="{BD1EE93E-8BFC-4282-90A1-6669D32FBCAB}" type="datetimeFigureOut">
               <a:rPr kumimoji="1" lang="ja-JP" altLang="en-US" smtClean="0"/>
               <a:pPr/>
-              <a:t>2011/10/21</a:t>
+              <a:t>2015/1/5</a:t>
             </a:fld>
             <a:endParaRPr kumimoji="1" lang="ja-JP" altLang="en-US"/>
           </a:p>
@@ -1006,7 +1013,7 @@
             <a:fld id="{04D974DD-768E-4670-957A-B0B82F33E5D4}" type="slidenum">
               <a:rPr kumimoji="1" lang="ja-JP" altLang="en-US" smtClean="0"/>
               <a:pPr/>
-              <a:t>&lt;#&gt;</a:t>
+              <a:t>‹#›</a:t>
             </a:fld>
             <a:endParaRPr kumimoji="1" lang="ja-JP" altLang="en-US"/>
           </a:p>
@@ -1172,7 +1179,7 @@
             <a:fld id="{BD1EE93E-8BFC-4282-90A1-6669D32FBCAB}" type="datetimeFigureOut">
               <a:rPr kumimoji="1" lang="ja-JP" altLang="en-US" smtClean="0"/>
               <a:pPr/>
-              <a:t>2011/10/21</a:t>
+              <a:t>2015/1/5</a:t>
             </a:fld>
             <a:endParaRPr kumimoji="1" lang="ja-JP" altLang="en-US"/>
           </a:p>
@@ -1215,7 +1222,7 @@
             <a:fld id="{04D974DD-768E-4670-957A-B0B82F33E5D4}" type="slidenum">
               <a:rPr kumimoji="1" lang="ja-JP" altLang="en-US" smtClean="0"/>
               <a:pPr/>
-              <a:t>&lt;#&gt;</a:t>
+              <a:t>‹#›</a:t>
             </a:fld>
             <a:endParaRPr kumimoji="1" lang="ja-JP" altLang="en-US"/>
           </a:p>
@@ -1371,7 +1378,7 @@
             <a:fld id="{BD1EE93E-8BFC-4282-90A1-6669D32FBCAB}" type="datetimeFigureOut">
               <a:rPr kumimoji="1" lang="ja-JP" altLang="en-US" smtClean="0"/>
               <a:pPr/>
-              <a:t>2011/10/21</a:t>
+              <a:t>2015/1/5</a:t>
             </a:fld>
             <a:endParaRPr kumimoji="1" lang="ja-JP" altLang="en-US"/>
           </a:p>
@@ -1414,7 +1421,7 @@
             <a:fld id="{04D974DD-768E-4670-957A-B0B82F33E5D4}" type="slidenum">
               <a:rPr kumimoji="1" lang="ja-JP" altLang="en-US" smtClean="0"/>
               <a:pPr/>
-              <a:t>&lt;#&gt;</a:t>
+              <a:t>‹#›</a:t>
             </a:fld>
             <a:endParaRPr kumimoji="1" lang="ja-JP" altLang="en-US"/>
           </a:p>
@@ -1614,7 +1621,7 @@
             <a:fld id="{BD1EE93E-8BFC-4282-90A1-6669D32FBCAB}" type="datetimeFigureOut">
               <a:rPr kumimoji="1" lang="ja-JP" altLang="en-US" smtClean="0"/>
               <a:pPr/>
-              <a:t>2011/10/21</a:t>
+              <a:t>2015/1/5</a:t>
             </a:fld>
             <a:endParaRPr kumimoji="1" lang="ja-JP" altLang="en-US"/>
           </a:p>
@@ -1657,7 +1664,7 @@
             <a:fld id="{04D974DD-768E-4670-957A-B0B82F33E5D4}" type="slidenum">
               <a:rPr kumimoji="1" lang="ja-JP" altLang="en-US" smtClean="0"/>
               <a:pPr/>
-              <a:t>&lt;#&gt;</a:t>
+              <a:t>‹#›</a:t>
             </a:fld>
             <a:endParaRPr kumimoji="1" lang="ja-JP" altLang="en-US"/>
           </a:p>
@@ -1963,7 +1970,7 @@
             <a:fld id="{BD1EE93E-8BFC-4282-90A1-6669D32FBCAB}" type="datetimeFigureOut">
               <a:rPr kumimoji="1" lang="ja-JP" altLang="en-US" smtClean="0"/>
               <a:pPr/>
-              <a:t>2011/10/21</a:t>
+              <a:t>2015/1/5</a:t>
             </a:fld>
             <a:endParaRPr kumimoji="1" lang="ja-JP" altLang="en-US"/>
           </a:p>
@@ -2006,7 +2013,7 @@
             <a:fld id="{04D974DD-768E-4670-957A-B0B82F33E5D4}" type="slidenum">
               <a:rPr kumimoji="1" lang="ja-JP" altLang="en-US" smtClean="0"/>
               <a:pPr/>
-              <a:t>&lt;#&gt;</a:t>
+              <a:t>‹#›</a:t>
             </a:fld>
             <a:endParaRPr kumimoji="1" lang="ja-JP" altLang="en-US"/>
           </a:p>
@@ -2446,7 +2453,7 @@
             <a:fld id="{BD1EE93E-8BFC-4282-90A1-6669D32FBCAB}" type="datetimeFigureOut">
               <a:rPr kumimoji="1" lang="ja-JP" altLang="en-US" smtClean="0"/>
               <a:pPr/>
-              <a:t>2011/10/21</a:t>
+              <a:t>2015/1/5</a:t>
             </a:fld>
             <a:endParaRPr kumimoji="1" lang="ja-JP" altLang="en-US"/>
           </a:p>
@@ -2489,7 +2496,7 @@
             <a:fld id="{04D974DD-768E-4670-957A-B0B82F33E5D4}" type="slidenum">
               <a:rPr kumimoji="1" lang="ja-JP" altLang="en-US" smtClean="0"/>
               <a:pPr/>
-              <a:t>&lt;#&gt;</a:t>
+              <a:t>‹#›</a:t>
             </a:fld>
             <a:endParaRPr kumimoji="1" lang="ja-JP" altLang="en-US"/>
           </a:p>
@@ -2561,7 +2568,7 @@
             <a:fld id="{BD1EE93E-8BFC-4282-90A1-6669D32FBCAB}" type="datetimeFigureOut">
               <a:rPr kumimoji="1" lang="ja-JP" altLang="en-US" smtClean="0"/>
               <a:pPr/>
-              <a:t>2011/10/21</a:t>
+              <a:t>2015/1/5</a:t>
             </a:fld>
             <a:endParaRPr kumimoji="1" lang="ja-JP" altLang="en-US"/>
           </a:p>
@@ -2604,7 +2611,7 @@
             <a:fld id="{04D974DD-768E-4670-957A-B0B82F33E5D4}" type="slidenum">
               <a:rPr kumimoji="1" lang="ja-JP" altLang="en-US" smtClean="0"/>
               <a:pPr/>
-              <a:t>&lt;#&gt;</a:t>
+              <a:t>‹#›</a:t>
             </a:fld>
             <a:endParaRPr kumimoji="1" lang="ja-JP" altLang="en-US"/>
           </a:p>
@@ -2653,7 +2660,7 @@
             <a:fld id="{BD1EE93E-8BFC-4282-90A1-6669D32FBCAB}" type="datetimeFigureOut">
               <a:rPr kumimoji="1" lang="ja-JP" altLang="en-US" smtClean="0"/>
               <a:pPr/>
-              <a:t>2011/10/21</a:t>
+              <a:t>2015/1/5</a:t>
             </a:fld>
             <a:endParaRPr kumimoji="1" lang="ja-JP" altLang="en-US"/>
           </a:p>
@@ -2696,7 +2703,7 @@
             <a:fld id="{04D974DD-768E-4670-957A-B0B82F33E5D4}" type="slidenum">
               <a:rPr kumimoji="1" lang="ja-JP" altLang="en-US" smtClean="0"/>
               <a:pPr/>
-              <a:t>&lt;#&gt;</a:t>
+              <a:t>‹#›</a:t>
             </a:fld>
             <a:endParaRPr kumimoji="1" lang="ja-JP" altLang="en-US"/>
           </a:p>
@@ -2959,7 +2966,7 @@
             <a:fld id="{BD1EE93E-8BFC-4282-90A1-6669D32FBCAB}" type="datetimeFigureOut">
               <a:rPr kumimoji="1" lang="ja-JP" altLang="en-US" smtClean="0"/>
               <a:pPr/>
-              <a:t>2011/10/21</a:t>
+              <a:t>2015/1/5</a:t>
             </a:fld>
             <a:endParaRPr kumimoji="1" lang="ja-JP" altLang="en-US"/>
           </a:p>
@@ -3002,7 +3009,7 @@
             <a:fld id="{04D974DD-768E-4670-957A-B0B82F33E5D4}" type="slidenum">
               <a:rPr kumimoji="1" lang="ja-JP" altLang="en-US" smtClean="0"/>
               <a:pPr/>
-              <a:t>&lt;#&gt;</a:t>
+              <a:t>‹#›</a:t>
             </a:fld>
             <a:endParaRPr kumimoji="1" lang="ja-JP" altLang="en-US"/>
           </a:p>
@@ -3209,7 +3216,7 @@
             <a:fld id="{BD1EE93E-8BFC-4282-90A1-6669D32FBCAB}" type="datetimeFigureOut">
               <a:rPr kumimoji="1" lang="ja-JP" altLang="en-US" smtClean="0"/>
               <a:pPr/>
-              <a:t>2011/10/21</a:t>
+              <a:t>2015/1/5</a:t>
             </a:fld>
             <a:endParaRPr kumimoji="1" lang="ja-JP" altLang="en-US"/>
           </a:p>
@@ -3252,7 +3259,7 @@
             <a:fld id="{04D974DD-768E-4670-957A-B0B82F33E5D4}" type="slidenum">
               <a:rPr kumimoji="1" lang="ja-JP" altLang="en-US" smtClean="0"/>
               <a:pPr/>
-              <a:t>&lt;#&gt;</a:t>
+              <a:t>‹#›</a:t>
             </a:fld>
             <a:endParaRPr kumimoji="1" lang="ja-JP" altLang="en-US"/>
           </a:p>
@@ -3451,7 +3458,7 @@
             <a:fld id="{BD1EE93E-8BFC-4282-90A1-6669D32FBCAB}" type="datetimeFigureOut">
               <a:rPr kumimoji="1" lang="ja-JP" altLang="en-US" smtClean="0"/>
               <a:pPr/>
-              <a:t>2011/10/21</a:t>
+              <a:t>2015/1/5</a:t>
             </a:fld>
             <a:endParaRPr kumimoji="1" lang="ja-JP" altLang="en-US"/>
           </a:p>
@@ -3530,7 +3537,7 @@
             <a:fld id="{04D974DD-768E-4670-957A-B0B82F33E5D4}" type="slidenum">
               <a:rPr kumimoji="1" lang="ja-JP" altLang="en-US" smtClean="0"/>
               <a:pPr/>
-              <a:t>&lt;#&gt;</a:t>
+              <a:t>‹#›</a:t>
             </a:fld>
             <a:endParaRPr kumimoji="1" lang="ja-JP" altLang="en-US"/>
           </a:p>
@@ -3824,6 +3831,1512 @@
       </p:grpSpPr>
       <p:sp>
         <p:nvSpPr>
+          <p:cNvPr id="4" name="角丸四角形 3"/>
+          <p:cNvSpPr/>
+          <p:nvPr/>
+        </p:nvSpPr>
+        <p:spPr>
+          <a:xfrm>
+            <a:off x="1251266" y="36717"/>
+            <a:ext cx="6159566" cy="4270912"/>
+          </a:xfrm>
+          <a:prstGeom prst="roundRect">
+            <a:avLst/>
+          </a:prstGeom>
+          <a:solidFill>
+            <a:schemeClr val="bg1">
+              <a:lumMod val="75000"/>
+            </a:schemeClr>
+          </a:solidFill>
+          <a:ln w="3175">
+            <a:prstDash val="lgDash"/>
+          </a:ln>
+        </p:spPr>
+        <p:style>
+          <a:lnRef idx="2">
+            <a:schemeClr val="dk1"/>
+          </a:lnRef>
+          <a:fillRef idx="1">
+            <a:schemeClr val="lt1"/>
+          </a:fillRef>
+          <a:effectRef idx="0">
+            <a:schemeClr val="dk1"/>
+          </a:effectRef>
+          <a:fontRef idx="minor">
+            <a:schemeClr val="dk1"/>
+          </a:fontRef>
+        </p:style>
+        <p:txBody>
+          <a:bodyPr rtlCol="0" anchor="t" anchorCtr="0"/>
+          <a:lstStyle/>
+          <a:p>
+            <a:pPr algn="ctr"/>
+            <a:r>
+              <a:rPr kumimoji="1" lang="ja-JP" altLang="en-US" sz="2000" dirty="0" smtClean="0">
+                <a:latin typeface="HGPｺﾞｼｯｸE" panose="020B0900000000000000" pitchFamily="50" charset="-128"/>
+                <a:ea typeface="HGPｺﾞｼｯｸE" panose="020B0900000000000000" pitchFamily="50" charset="-128"/>
+              </a:rPr>
+              <a:t>ジョブ実装クラス</a:t>
+            </a:r>
+            <a:endParaRPr kumimoji="1" lang="en-US" altLang="ja-JP" sz="2000" dirty="0" smtClean="0">
+              <a:latin typeface="HGPｺﾞｼｯｸE" panose="020B0900000000000000" pitchFamily="50" charset="-128"/>
+              <a:ea typeface="HGPｺﾞｼｯｸE" panose="020B0900000000000000" pitchFamily="50" charset="-128"/>
+            </a:endParaRPr>
+          </a:p>
+          <a:p>
+            <a:pPr algn="ctr"/>
+            <a:endParaRPr kumimoji="1" lang="en-US" altLang="ja-JP" sz="2000" dirty="0" smtClean="0">
+              <a:latin typeface="HGPｺﾞｼｯｸE" panose="020B0900000000000000" pitchFamily="50" charset="-128"/>
+              <a:ea typeface="HGPｺﾞｼｯｸE" panose="020B0900000000000000" pitchFamily="50" charset="-128"/>
+            </a:endParaRPr>
+          </a:p>
+          <a:p>
+            <a:r>
+              <a:rPr lang="ja-JP" altLang="en-US" sz="2000" dirty="0" smtClean="0">
+                <a:latin typeface="HGPｺﾞｼｯｸE" panose="020B0900000000000000" pitchFamily="50" charset="-128"/>
+                <a:ea typeface="HGPｺﾞｼｯｸE" panose="020B0900000000000000" pitchFamily="50" charset="-128"/>
+              </a:rPr>
+              <a:t>開発者</a:t>
+            </a:r>
+            <a:r>
+              <a:rPr lang="en-US" altLang="ja-JP" sz="2000" dirty="0" smtClean="0">
+                <a:latin typeface="HGPｺﾞｼｯｸE" panose="020B0900000000000000" pitchFamily="50" charset="-128"/>
+                <a:ea typeface="HGPｺﾞｼｯｸE" panose="020B0900000000000000" pitchFamily="50" charset="-128"/>
+              </a:rPr>
+              <a:t>(</a:t>
+            </a:r>
+            <a:r>
+              <a:rPr lang="ja-JP" altLang="en-US" sz="2000" dirty="0" smtClean="0">
+                <a:latin typeface="HGPｺﾞｼｯｸE" panose="020B0900000000000000" pitchFamily="50" charset="-128"/>
+                <a:ea typeface="HGPｺﾞｼｯｸE" panose="020B0900000000000000" pitchFamily="50" charset="-128"/>
+              </a:rPr>
+              <a:t>プログラマ</a:t>
+            </a:r>
+            <a:r>
+              <a:rPr lang="en-US" altLang="ja-JP" sz="2000" dirty="0" smtClean="0">
+                <a:latin typeface="HGPｺﾞｼｯｸE" panose="020B0900000000000000" pitchFamily="50" charset="-128"/>
+                <a:ea typeface="HGPｺﾞｼｯｸE" panose="020B0900000000000000" pitchFamily="50" charset="-128"/>
+              </a:rPr>
+              <a:t>)</a:t>
+            </a:r>
+            <a:r>
+              <a:rPr lang="ja-JP" altLang="en-US" sz="2000" dirty="0" smtClean="0">
+                <a:latin typeface="HGPｺﾞｼｯｸE" panose="020B0900000000000000" pitchFamily="50" charset="-128"/>
+                <a:ea typeface="HGPｺﾞｼｯｸE" panose="020B0900000000000000" pitchFamily="50" charset="-128"/>
+              </a:rPr>
+              <a:t>が、構造化プログラミング</a:t>
+            </a:r>
+            <a:endParaRPr lang="en-US" altLang="ja-JP" sz="2000" dirty="0" smtClean="0">
+              <a:latin typeface="HGPｺﾞｼｯｸE" panose="020B0900000000000000" pitchFamily="50" charset="-128"/>
+              <a:ea typeface="HGPｺﾞｼｯｸE" panose="020B0900000000000000" pitchFamily="50" charset="-128"/>
+            </a:endParaRPr>
+          </a:p>
+          <a:p>
+            <a:r>
+              <a:rPr lang="ja-JP" altLang="en-US" sz="2000" dirty="0" smtClean="0">
+                <a:latin typeface="HGPｺﾞｼｯｸE" panose="020B0900000000000000" pitchFamily="50" charset="-128"/>
+                <a:ea typeface="HGPｺﾞｼｯｸE" panose="020B0900000000000000" pitchFamily="50" charset="-128"/>
+              </a:rPr>
+              <a:t>手法</a:t>
+            </a:r>
+            <a:r>
+              <a:rPr lang="en-US" altLang="ja-JP" sz="2000" dirty="0" smtClean="0">
+                <a:latin typeface="HGPｺﾞｼｯｸE" panose="020B0900000000000000" pitchFamily="50" charset="-128"/>
+                <a:ea typeface="HGPｺﾞｼｯｸE" panose="020B0900000000000000" pitchFamily="50" charset="-128"/>
+              </a:rPr>
+              <a:t>(if/else, for, while</a:t>
+            </a:r>
+            <a:r>
+              <a:rPr lang="ja-JP" altLang="en-US" sz="2000" dirty="0" smtClean="0">
+                <a:latin typeface="HGPｺﾞｼｯｸE" panose="020B0900000000000000" pitchFamily="50" charset="-128"/>
+                <a:ea typeface="HGPｺﾞｼｯｸE" panose="020B0900000000000000" pitchFamily="50" charset="-128"/>
+              </a:rPr>
+              <a:t>等</a:t>
+            </a:r>
+            <a:r>
+              <a:rPr lang="en-US" altLang="ja-JP" sz="2000" dirty="0" smtClean="0">
+                <a:latin typeface="HGPｺﾞｼｯｸE" panose="020B0900000000000000" pitchFamily="50" charset="-128"/>
+                <a:ea typeface="HGPｺﾞｼｯｸE" panose="020B0900000000000000" pitchFamily="50" charset="-128"/>
+              </a:rPr>
+              <a:t>)</a:t>
+            </a:r>
+            <a:r>
+              <a:rPr lang="ja-JP" altLang="en-US" sz="2000" dirty="0" smtClean="0">
+                <a:latin typeface="HGPｺﾞｼｯｸE" panose="020B0900000000000000" pitchFamily="50" charset="-128"/>
+                <a:ea typeface="HGPｺﾞｼｯｸE" panose="020B0900000000000000" pitchFamily="50" charset="-128"/>
+              </a:rPr>
+              <a:t>で実装。</a:t>
+            </a:r>
+            <a:endParaRPr lang="en-US" altLang="ja-JP" sz="2000" dirty="0" smtClean="0">
+              <a:latin typeface="HGPｺﾞｼｯｸE" panose="020B0900000000000000" pitchFamily="50" charset="-128"/>
+              <a:ea typeface="HGPｺﾞｼｯｸE" panose="020B0900000000000000" pitchFamily="50" charset="-128"/>
+            </a:endParaRPr>
+          </a:p>
+          <a:p>
+            <a:r>
+              <a:rPr kumimoji="1" lang="ja-JP" altLang="en-US" sz="2000" dirty="0" smtClean="0">
+                <a:latin typeface="HGPｺﾞｼｯｸE" panose="020B0900000000000000" pitchFamily="50" charset="-128"/>
+                <a:ea typeface="HGPｺﾞｼｯｸE" panose="020B0900000000000000" pitchFamily="50" charset="-128"/>
+              </a:rPr>
+              <a:t>「バッチ機能コンポーネント</a:t>
+            </a:r>
+            <a:r>
+              <a:rPr kumimoji="1" lang="ja-JP" altLang="en-US" sz="2000" dirty="0" smtClean="0">
+                <a:latin typeface="HGPｺﾞｼｯｸE" panose="020B0900000000000000" pitchFamily="50" charset="-128"/>
+                <a:ea typeface="HGPｺﾞｼｯｸE" panose="020B0900000000000000" pitchFamily="50" charset="-128"/>
+              </a:rPr>
+              <a:t>」を</a:t>
+            </a:r>
+            <a:r>
+              <a:rPr kumimoji="1" lang="ja-JP" altLang="en-US" sz="2000" dirty="0" smtClean="0">
+                <a:latin typeface="HGPｺﾞｼｯｸE" panose="020B0900000000000000" pitchFamily="50" charset="-128"/>
+                <a:ea typeface="HGPｺﾞｼｯｸE" panose="020B0900000000000000" pitchFamily="50" charset="-128"/>
+              </a:rPr>
+              <a:t>必要に応じて呼び出す。</a:t>
+            </a:r>
+            <a:endParaRPr kumimoji="1" lang="ja-JP" altLang="en-US" sz="2000" dirty="0">
+              <a:latin typeface="HGPｺﾞｼｯｸE" panose="020B0900000000000000" pitchFamily="50" charset="-128"/>
+              <a:ea typeface="HGPｺﾞｼｯｸE" panose="020B0900000000000000" pitchFamily="50" charset="-128"/>
+            </a:endParaRPr>
+          </a:p>
+        </p:txBody>
+      </p:sp>
+      <p:sp>
+        <p:nvSpPr>
+          <p:cNvPr id="7" name="角丸四角形 6"/>
+          <p:cNvSpPr/>
+          <p:nvPr/>
+        </p:nvSpPr>
+        <p:spPr>
+          <a:xfrm>
+            <a:off x="-2412776" y="36717"/>
+            <a:ext cx="2665292" cy="4393728"/>
+          </a:xfrm>
+          <a:prstGeom prst="roundRect">
+            <a:avLst/>
+          </a:prstGeom>
+          <a:ln w="3175">
+            <a:prstDash val="dash"/>
+          </a:ln>
+        </p:spPr>
+        <p:style>
+          <a:lnRef idx="2">
+            <a:schemeClr val="dk1"/>
+          </a:lnRef>
+          <a:fillRef idx="1">
+            <a:schemeClr val="lt1"/>
+          </a:fillRef>
+          <a:effectRef idx="0">
+            <a:schemeClr val="dk1"/>
+          </a:effectRef>
+          <a:fontRef idx="minor">
+            <a:schemeClr val="dk1"/>
+          </a:fontRef>
+        </p:style>
+        <p:txBody>
+          <a:bodyPr rtlCol="0" anchor="t" anchorCtr="0"/>
+          <a:lstStyle/>
+          <a:p>
+            <a:pPr algn="ctr"/>
+            <a:r>
+              <a:rPr kumimoji="1" lang="ja-JP" altLang="en-US" dirty="0" smtClean="0">
+                <a:latin typeface="HGPｺﾞｼｯｸE" panose="020B0900000000000000" pitchFamily="50" charset="-128"/>
+                <a:ea typeface="HGPｺﾞｼｯｸE" panose="020B0900000000000000" pitchFamily="50" charset="-128"/>
+              </a:rPr>
+              <a:t>バッチ実行基盤</a:t>
+            </a:r>
+            <a:endParaRPr kumimoji="1" lang="ja-JP" altLang="en-US" dirty="0">
+              <a:latin typeface="HGPｺﾞｼｯｸE" panose="020B0900000000000000" pitchFamily="50" charset="-128"/>
+              <a:ea typeface="HGPｺﾞｼｯｸE" panose="020B0900000000000000" pitchFamily="50" charset="-128"/>
+            </a:endParaRPr>
+          </a:p>
+        </p:txBody>
+      </p:sp>
+      <p:sp>
+        <p:nvSpPr>
+          <p:cNvPr id="8" name="角丸四角形 7"/>
+          <p:cNvSpPr/>
+          <p:nvPr/>
+        </p:nvSpPr>
+        <p:spPr>
+          <a:xfrm>
+            <a:off x="8086519" y="36717"/>
+            <a:ext cx="3844170" cy="6488627"/>
+          </a:xfrm>
+          <a:prstGeom prst="roundRect">
+            <a:avLst/>
+          </a:prstGeom>
+          <a:ln w="3175">
+            <a:prstDash val="dash"/>
+          </a:ln>
+        </p:spPr>
+        <p:style>
+          <a:lnRef idx="2">
+            <a:schemeClr val="dk1"/>
+          </a:lnRef>
+          <a:fillRef idx="1">
+            <a:schemeClr val="lt1"/>
+          </a:fillRef>
+          <a:effectRef idx="0">
+            <a:schemeClr val="dk1"/>
+          </a:effectRef>
+          <a:fontRef idx="minor">
+            <a:schemeClr val="dk1"/>
+          </a:fontRef>
+        </p:style>
+        <p:txBody>
+          <a:bodyPr rtlCol="0" anchor="t" anchorCtr="0"/>
+          <a:lstStyle/>
+          <a:p>
+            <a:pPr algn="ctr"/>
+            <a:r>
+              <a:rPr lang="ja-JP" altLang="en-US" dirty="0" smtClean="0">
+                <a:latin typeface="HGPｺﾞｼｯｸE" panose="020B0900000000000000" pitchFamily="50" charset="-128"/>
+                <a:ea typeface="HGPｺﾞｼｯｸE" panose="020B0900000000000000" pitchFamily="50" charset="-128"/>
+              </a:rPr>
+              <a:t>バッチ機能</a:t>
+            </a:r>
+            <a:r>
+              <a:rPr lang="ja-JP" altLang="en-US" dirty="0">
+                <a:latin typeface="HGPｺﾞｼｯｸE" panose="020B0900000000000000" pitchFamily="50" charset="-128"/>
+                <a:ea typeface="HGPｺﾞｼｯｸE" panose="020B0900000000000000" pitchFamily="50" charset="-128"/>
+              </a:rPr>
+              <a:t>コンポーネント</a:t>
+            </a:r>
+          </a:p>
+        </p:txBody>
+      </p:sp>
+      <p:sp>
+        <p:nvSpPr>
+          <p:cNvPr id="5" name="角丸四角形 4"/>
+          <p:cNvSpPr/>
+          <p:nvPr/>
+        </p:nvSpPr>
+        <p:spPr>
+          <a:xfrm>
+            <a:off x="8402745" y="839200"/>
+            <a:ext cx="3020420" cy="447686"/>
+          </a:xfrm>
+          <a:prstGeom prst="roundRect">
+            <a:avLst/>
+          </a:prstGeom>
+          <a:solidFill>
+            <a:srgbClr val="FFC000"/>
+          </a:solidFill>
+          <a:ln w="3175"/>
+        </p:spPr>
+        <p:style>
+          <a:lnRef idx="2">
+            <a:schemeClr val="dk1"/>
+          </a:lnRef>
+          <a:fillRef idx="1">
+            <a:schemeClr val="lt1"/>
+          </a:fillRef>
+          <a:effectRef idx="0">
+            <a:schemeClr val="dk1"/>
+          </a:effectRef>
+          <a:fontRef idx="minor">
+            <a:schemeClr val="dk1"/>
+          </a:fontRef>
+        </p:style>
+        <p:txBody>
+          <a:bodyPr rtlCol="0" anchor="ctr"/>
+          <a:lstStyle/>
+          <a:p>
+            <a:pPr algn="ctr"/>
+            <a:r>
+              <a:rPr kumimoji="1" lang="ja-JP" altLang="en-US" dirty="0" smtClean="0">
+                <a:latin typeface="HGSｺﾞｼｯｸE" panose="020B0900000000000000" pitchFamily="50" charset="-128"/>
+                <a:ea typeface="HGSｺﾞｼｯｸE" panose="020B0900000000000000" pitchFamily="50" charset="-128"/>
+              </a:rPr>
+              <a:t>トランザクション管理</a:t>
+            </a:r>
+            <a:endParaRPr kumimoji="1" lang="ja-JP" altLang="en-US" dirty="0">
+              <a:latin typeface="HGSｺﾞｼｯｸE" panose="020B0900000000000000" pitchFamily="50" charset="-128"/>
+              <a:ea typeface="HGSｺﾞｼｯｸE" panose="020B0900000000000000" pitchFamily="50" charset="-128"/>
+            </a:endParaRPr>
+          </a:p>
+        </p:txBody>
+      </p:sp>
+      <p:sp>
+        <p:nvSpPr>
+          <p:cNvPr id="10" name="角丸四角形 9"/>
+          <p:cNvSpPr/>
+          <p:nvPr/>
+        </p:nvSpPr>
+        <p:spPr>
+          <a:xfrm>
+            <a:off x="8408384" y="2015550"/>
+            <a:ext cx="3020420" cy="451130"/>
+          </a:xfrm>
+          <a:prstGeom prst="roundRect">
+            <a:avLst/>
+          </a:prstGeom>
+          <a:solidFill>
+            <a:srgbClr val="FFC000"/>
+          </a:solidFill>
+          <a:ln w="3175"/>
+        </p:spPr>
+        <p:style>
+          <a:lnRef idx="2">
+            <a:schemeClr val="dk1"/>
+          </a:lnRef>
+          <a:fillRef idx="1">
+            <a:schemeClr val="lt1"/>
+          </a:fillRef>
+          <a:effectRef idx="0">
+            <a:schemeClr val="dk1"/>
+          </a:effectRef>
+          <a:fontRef idx="minor">
+            <a:schemeClr val="dk1"/>
+          </a:fontRef>
+        </p:style>
+        <p:txBody>
+          <a:bodyPr rtlCol="0" anchor="ctr"/>
+          <a:lstStyle/>
+          <a:p>
+            <a:pPr algn="ctr"/>
+            <a:r>
+              <a:rPr kumimoji="1" lang="ja-JP" altLang="en-US" dirty="0" smtClean="0">
+                <a:latin typeface="HGSｺﾞｼｯｸE" panose="020B0900000000000000" pitchFamily="50" charset="-128"/>
+                <a:ea typeface="HGSｺﾞｼｯｸE" panose="020B0900000000000000" pitchFamily="50" charset="-128"/>
+              </a:rPr>
+              <a:t>ファイルアクセス</a:t>
+            </a:r>
+            <a:endParaRPr kumimoji="1" lang="ja-JP" altLang="en-US" dirty="0">
+              <a:latin typeface="HGSｺﾞｼｯｸE" panose="020B0900000000000000" pitchFamily="50" charset="-128"/>
+              <a:ea typeface="HGSｺﾞｼｯｸE" panose="020B0900000000000000" pitchFamily="50" charset="-128"/>
+            </a:endParaRPr>
+          </a:p>
+        </p:txBody>
+      </p:sp>
+      <p:sp>
+        <p:nvSpPr>
+          <p:cNvPr id="11" name="角丸四角形 10"/>
+          <p:cNvSpPr/>
+          <p:nvPr/>
+        </p:nvSpPr>
+        <p:spPr>
+          <a:xfrm>
+            <a:off x="8415612" y="2656884"/>
+            <a:ext cx="3020420" cy="447686"/>
+          </a:xfrm>
+          <a:prstGeom prst="roundRect">
+            <a:avLst/>
+          </a:prstGeom>
+          <a:solidFill>
+            <a:srgbClr val="FFC000"/>
+          </a:solidFill>
+          <a:ln w="3175"/>
+        </p:spPr>
+        <p:style>
+          <a:lnRef idx="2">
+            <a:schemeClr val="dk1"/>
+          </a:lnRef>
+          <a:fillRef idx="1">
+            <a:schemeClr val="lt1"/>
+          </a:fillRef>
+          <a:effectRef idx="0">
+            <a:schemeClr val="dk1"/>
+          </a:effectRef>
+          <a:fontRef idx="minor">
+            <a:schemeClr val="dk1"/>
+          </a:fontRef>
+        </p:style>
+        <p:txBody>
+          <a:bodyPr rtlCol="0" anchor="ctr"/>
+          <a:lstStyle/>
+          <a:p>
+            <a:pPr algn="ctr"/>
+            <a:r>
+              <a:rPr kumimoji="1" lang="ja-JP" altLang="en-US" dirty="0" smtClean="0">
+                <a:latin typeface="HGSｺﾞｼｯｸE" panose="020B0900000000000000" pitchFamily="50" charset="-128"/>
+                <a:ea typeface="HGSｺﾞｼｯｸE" panose="020B0900000000000000" pitchFamily="50" charset="-128"/>
+              </a:rPr>
+              <a:t>入力データ取得</a:t>
+            </a:r>
+            <a:endParaRPr kumimoji="1" lang="ja-JP" altLang="en-US" dirty="0">
+              <a:latin typeface="HGSｺﾞｼｯｸE" panose="020B0900000000000000" pitchFamily="50" charset="-128"/>
+              <a:ea typeface="HGSｺﾞｼｯｸE" panose="020B0900000000000000" pitchFamily="50" charset="-128"/>
+            </a:endParaRPr>
+          </a:p>
+        </p:txBody>
+      </p:sp>
+      <p:sp>
+        <p:nvSpPr>
+          <p:cNvPr id="12" name="角丸四角形 11"/>
+          <p:cNvSpPr/>
+          <p:nvPr/>
+        </p:nvSpPr>
+        <p:spPr>
+          <a:xfrm>
+            <a:off x="8415612" y="3253305"/>
+            <a:ext cx="3020420" cy="447686"/>
+          </a:xfrm>
+          <a:prstGeom prst="roundRect">
+            <a:avLst/>
+          </a:prstGeom>
+          <a:solidFill>
+            <a:srgbClr val="FFC000"/>
+          </a:solidFill>
+          <a:ln w="3175"/>
+        </p:spPr>
+        <p:style>
+          <a:lnRef idx="2">
+            <a:schemeClr val="dk1"/>
+          </a:lnRef>
+          <a:fillRef idx="1">
+            <a:schemeClr val="lt1"/>
+          </a:fillRef>
+          <a:effectRef idx="0">
+            <a:schemeClr val="dk1"/>
+          </a:effectRef>
+          <a:fontRef idx="minor">
+            <a:schemeClr val="dk1"/>
+          </a:fontRef>
+        </p:style>
+        <p:txBody>
+          <a:bodyPr rtlCol="0" anchor="ctr"/>
+          <a:lstStyle/>
+          <a:p>
+            <a:pPr algn="ctr"/>
+            <a:r>
+              <a:rPr kumimoji="1" lang="ja-JP" altLang="en-US" dirty="0" smtClean="0">
+                <a:latin typeface="HGSｺﾞｼｯｸE" panose="020B0900000000000000" pitchFamily="50" charset="-128"/>
+                <a:ea typeface="HGSｺﾞｼｯｸE" panose="020B0900000000000000" pitchFamily="50" charset="-128"/>
+              </a:rPr>
+              <a:t>入力チェック</a:t>
+            </a:r>
+            <a:endParaRPr kumimoji="1" lang="ja-JP" altLang="en-US" dirty="0">
+              <a:latin typeface="HGSｺﾞｼｯｸE" panose="020B0900000000000000" pitchFamily="50" charset="-128"/>
+              <a:ea typeface="HGSｺﾞｼｯｸE" panose="020B0900000000000000" pitchFamily="50" charset="-128"/>
+            </a:endParaRPr>
+          </a:p>
+        </p:txBody>
+      </p:sp>
+      <p:sp>
+        <p:nvSpPr>
+          <p:cNvPr id="14" name="角丸四角形 13"/>
+          <p:cNvSpPr/>
+          <p:nvPr/>
+        </p:nvSpPr>
+        <p:spPr>
+          <a:xfrm>
+            <a:off x="8415612" y="3838586"/>
+            <a:ext cx="3020420" cy="447652"/>
+          </a:xfrm>
+          <a:prstGeom prst="roundRect">
+            <a:avLst/>
+          </a:prstGeom>
+          <a:solidFill>
+            <a:srgbClr val="FFC000"/>
+          </a:solidFill>
+          <a:ln w="3175"/>
+        </p:spPr>
+        <p:style>
+          <a:lnRef idx="2">
+            <a:schemeClr val="dk1"/>
+          </a:lnRef>
+          <a:fillRef idx="1">
+            <a:schemeClr val="lt1"/>
+          </a:fillRef>
+          <a:effectRef idx="0">
+            <a:schemeClr val="dk1"/>
+          </a:effectRef>
+          <a:fontRef idx="minor">
+            <a:schemeClr val="dk1"/>
+          </a:fontRef>
+        </p:style>
+        <p:txBody>
+          <a:bodyPr rtlCol="0" anchor="ctr"/>
+          <a:lstStyle/>
+          <a:p>
+            <a:pPr algn="ctr"/>
+            <a:r>
+              <a:rPr kumimoji="1" lang="ja-JP" altLang="en-US" dirty="0" smtClean="0">
+                <a:latin typeface="HGPｺﾞｼｯｸE" panose="020B0900000000000000" pitchFamily="50" charset="-128"/>
+                <a:ea typeface="HGPｺﾞｼｯｸE" panose="020B0900000000000000" pitchFamily="50" charset="-128"/>
+              </a:rPr>
+              <a:t>コントロールブレイク</a:t>
+            </a:r>
+            <a:endParaRPr kumimoji="1" lang="ja-JP" altLang="en-US" dirty="0">
+              <a:latin typeface="HGPｺﾞｼｯｸE" panose="020B0900000000000000" pitchFamily="50" charset="-128"/>
+              <a:ea typeface="HGPｺﾞｼｯｸE" panose="020B0900000000000000" pitchFamily="50" charset="-128"/>
+            </a:endParaRPr>
+          </a:p>
+        </p:txBody>
+      </p:sp>
+      <p:sp>
+        <p:nvSpPr>
+          <p:cNvPr id="15" name="四角形吹き出し 14"/>
+          <p:cNvSpPr/>
+          <p:nvPr/>
+        </p:nvSpPr>
+        <p:spPr>
+          <a:xfrm>
+            <a:off x="8402745" y="5160589"/>
+            <a:ext cx="3157712" cy="801106"/>
+          </a:xfrm>
+          <a:prstGeom prst="wedgeRectCallout">
+            <a:avLst>
+              <a:gd name="adj1" fmla="val 9512"/>
+              <a:gd name="adj2" fmla="val -94217"/>
+            </a:avLst>
+          </a:prstGeom>
+          <a:solidFill>
+            <a:srgbClr val="FFC000"/>
+          </a:solidFill>
+          <a:ln w="3175"/>
+        </p:spPr>
+        <p:style>
+          <a:lnRef idx="2">
+            <a:schemeClr val="dk1"/>
+          </a:lnRef>
+          <a:fillRef idx="1">
+            <a:schemeClr val="lt1"/>
+          </a:fillRef>
+          <a:effectRef idx="0">
+            <a:schemeClr val="dk1"/>
+          </a:effectRef>
+          <a:fontRef idx="minor">
+            <a:schemeClr val="dk1"/>
+          </a:fontRef>
+        </p:style>
+        <p:txBody>
+          <a:bodyPr rtlCol="0" anchor="ctr"/>
+          <a:lstStyle/>
+          <a:p>
+            <a:pPr algn="ctr"/>
+            <a:r>
+              <a:rPr kumimoji="1" lang="ja-JP" altLang="en-US" dirty="0" smtClean="0">
+                <a:latin typeface="HGPｺﾞｼｯｸE" panose="020B0900000000000000" pitchFamily="50" charset="-128"/>
+                <a:ea typeface="HGPｺﾞｼｯｸE" panose="020B0900000000000000" pitchFamily="50" charset="-128"/>
+              </a:rPr>
+              <a:t>バッチ開発にて必要な</a:t>
+            </a:r>
+            <a:endParaRPr kumimoji="1" lang="en-US" altLang="ja-JP" dirty="0" smtClean="0">
+              <a:latin typeface="HGPｺﾞｼｯｸE" panose="020B0900000000000000" pitchFamily="50" charset="-128"/>
+              <a:ea typeface="HGPｺﾞｼｯｸE" panose="020B0900000000000000" pitchFamily="50" charset="-128"/>
+            </a:endParaRPr>
+          </a:p>
+          <a:p>
+            <a:pPr algn="ctr"/>
+            <a:r>
+              <a:rPr kumimoji="1" lang="ja-JP" altLang="en-US" dirty="0" smtClean="0">
+                <a:latin typeface="HGPｺﾞｼｯｸE" panose="020B0900000000000000" pitchFamily="50" charset="-128"/>
+                <a:ea typeface="HGPｺﾞｼｯｸE" panose="020B0900000000000000" pitchFamily="50" charset="-128"/>
+              </a:rPr>
+              <a:t>機能をコンポーネント化</a:t>
+            </a:r>
+            <a:endParaRPr kumimoji="1" lang="ja-JP" altLang="en-US" dirty="0">
+              <a:latin typeface="HGPｺﾞｼｯｸE" panose="020B0900000000000000" pitchFamily="50" charset="-128"/>
+              <a:ea typeface="HGPｺﾞｼｯｸE" panose="020B0900000000000000" pitchFamily="50" charset="-128"/>
+            </a:endParaRPr>
+          </a:p>
+        </p:txBody>
+      </p:sp>
+      <p:sp>
+        <p:nvSpPr>
+          <p:cNvPr id="6" name="フローチャート : 結合子 5"/>
+          <p:cNvSpPr/>
+          <p:nvPr/>
+        </p:nvSpPr>
+        <p:spPr>
+          <a:xfrm>
+            <a:off x="9798607" y="4883337"/>
+            <a:ext cx="74790" cy="57222"/>
+          </a:xfrm>
+          <a:prstGeom prst="flowChartConnector">
+            <a:avLst/>
+          </a:prstGeom>
+        </p:spPr>
+        <p:style>
+          <a:lnRef idx="2">
+            <a:schemeClr val="dk1">
+              <a:shade val="50000"/>
+            </a:schemeClr>
+          </a:lnRef>
+          <a:fillRef idx="1">
+            <a:schemeClr val="dk1"/>
+          </a:fillRef>
+          <a:effectRef idx="0">
+            <a:schemeClr val="dk1"/>
+          </a:effectRef>
+          <a:fontRef idx="minor">
+            <a:schemeClr val="lt1"/>
+          </a:fontRef>
+        </p:style>
+        <p:txBody>
+          <a:bodyPr rtlCol="0" anchor="ctr"/>
+          <a:lstStyle/>
+          <a:p>
+            <a:pPr algn="ctr"/>
+            <a:endParaRPr kumimoji="1" lang="ja-JP" altLang="en-US"/>
+          </a:p>
+        </p:txBody>
+      </p:sp>
+      <p:sp>
+        <p:nvSpPr>
+          <p:cNvPr id="17" name="フローチャート : 結合子 16"/>
+          <p:cNvSpPr/>
+          <p:nvPr/>
+        </p:nvSpPr>
+        <p:spPr>
+          <a:xfrm>
+            <a:off x="9791379" y="4430445"/>
+            <a:ext cx="74790" cy="57222"/>
+          </a:xfrm>
+          <a:prstGeom prst="flowChartConnector">
+            <a:avLst/>
+          </a:prstGeom>
+        </p:spPr>
+        <p:style>
+          <a:lnRef idx="2">
+            <a:schemeClr val="dk1">
+              <a:shade val="50000"/>
+            </a:schemeClr>
+          </a:lnRef>
+          <a:fillRef idx="1">
+            <a:schemeClr val="dk1"/>
+          </a:fillRef>
+          <a:effectRef idx="0">
+            <a:schemeClr val="dk1"/>
+          </a:effectRef>
+          <a:fontRef idx="minor">
+            <a:schemeClr val="lt1"/>
+          </a:fontRef>
+        </p:style>
+        <p:txBody>
+          <a:bodyPr rtlCol="0" anchor="ctr"/>
+          <a:lstStyle/>
+          <a:p>
+            <a:pPr algn="ctr"/>
+            <a:endParaRPr kumimoji="1" lang="ja-JP" altLang="en-US"/>
+          </a:p>
+        </p:txBody>
+      </p:sp>
+      <p:sp>
+        <p:nvSpPr>
+          <p:cNvPr id="18" name="フローチャート : 結合子 17"/>
+          <p:cNvSpPr/>
+          <p:nvPr/>
+        </p:nvSpPr>
+        <p:spPr>
+          <a:xfrm>
+            <a:off x="9798607" y="4646469"/>
+            <a:ext cx="74790" cy="57222"/>
+          </a:xfrm>
+          <a:prstGeom prst="flowChartConnector">
+            <a:avLst/>
+          </a:prstGeom>
+        </p:spPr>
+        <p:style>
+          <a:lnRef idx="2">
+            <a:schemeClr val="dk1">
+              <a:shade val="50000"/>
+            </a:schemeClr>
+          </a:lnRef>
+          <a:fillRef idx="1">
+            <a:schemeClr val="dk1"/>
+          </a:fillRef>
+          <a:effectRef idx="0">
+            <a:schemeClr val="dk1"/>
+          </a:effectRef>
+          <a:fontRef idx="minor">
+            <a:schemeClr val="lt1"/>
+          </a:fontRef>
+        </p:style>
+        <p:txBody>
+          <a:bodyPr rtlCol="0" anchor="ctr"/>
+          <a:lstStyle/>
+          <a:p>
+            <a:pPr algn="ctr"/>
+            <a:endParaRPr kumimoji="1" lang="ja-JP" altLang="en-US"/>
+          </a:p>
+        </p:txBody>
+      </p:sp>
+      <p:sp>
+        <p:nvSpPr>
+          <p:cNvPr id="9" name="下矢印 8"/>
+          <p:cNvSpPr/>
+          <p:nvPr/>
+        </p:nvSpPr>
+        <p:spPr>
+          <a:xfrm rot="16200000">
+            <a:off x="292520" y="962037"/>
+            <a:ext cx="1008200" cy="1210214"/>
+          </a:xfrm>
+          <a:prstGeom prst="downArrow">
+            <a:avLst/>
+          </a:prstGeom>
+          <a:ln w="3175"/>
+        </p:spPr>
+        <p:style>
+          <a:lnRef idx="2">
+            <a:schemeClr val="dk1"/>
+          </a:lnRef>
+          <a:fillRef idx="1">
+            <a:schemeClr val="lt1"/>
+          </a:fillRef>
+          <a:effectRef idx="0">
+            <a:schemeClr val="dk1"/>
+          </a:effectRef>
+          <a:fontRef idx="minor">
+            <a:schemeClr val="dk1"/>
+          </a:fontRef>
+        </p:style>
+        <p:txBody>
+          <a:bodyPr vert="vert" wrap="none" rtlCol="0" anchor="ctr"/>
+          <a:lstStyle/>
+          <a:p>
+            <a:pPr algn="ctr"/>
+            <a:r>
+              <a:rPr lang="ja-JP" altLang="en-US" dirty="0">
+                <a:latin typeface="HGPｺﾞｼｯｸE" panose="020B0900000000000000" pitchFamily="50" charset="-128"/>
+                <a:ea typeface="HGPｺﾞｼｯｸE" panose="020B0900000000000000" pitchFamily="50" charset="-128"/>
+              </a:rPr>
+              <a:t>呼び出し</a:t>
+            </a:r>
+            <a:endParaRPr kumimoji="1" lang="ja-JP" altLang="en-US" dirty="0">
+              <a:latin typeface="HGPｺﾞｼｯｸE" panose="020B0900000000000000" pitchFamily="50" charset="-128"/>
+              <a:ea typeface="HGPｺﾞｼｯｸE" panose="020B0900000000000000" pitchFamily="50" charset="-128"/>
+            </a:endParaRPr>
+          </a:p>
+        </p:txBody>
+      </p:sp>
+      <p:sp>
+        <p:nvSpPr>
+          <p:cNvPr id="20" name="角丸四角形 19"/>
+          <p:cNvSpPr/>
+          <p:nvPr/>
+        </p:nvSpPr>
+        <p:spPr>
+          <a:xfrm>
+            <a:off x="-2105125" y="1016787"/>
+            <a:ext cx="2039764" cy="1287730"/>
+          </a:xfrm>
+          <a:prstGeom prst="roundRect">
+            <a:avLst/>
+          </a:prstGeom>
+          <a:solidFill>
+            <a:srgbClr val="FFC000"/>
+          </a:solidFill>
+          <a:ln w="3175"/>
+        </p:spPr>
+        <p:style>
+          <a:lnRef idx="2">
+            <a:schemeClr val="dk1"/>
+          </a:lnRef>
+          <a:fillRef idx="1">
+            <a:schemeClr val="lt1"/>
+          </a:fillRef>
+          <a:effectRef idx="0">
+            <a:schemeClr val="dk1"/>
+          </a:effectRef>
+          <a:fontRef idx="minor">
+            <a:schemeClr val="dk1"/>
+          </a:fontRef>
+        </p:style>
+        <p:txBody>
+          <a:bodyPr rtlCol="0" anchor="ctr"/>
+          <a:lstStyle/>
+          <a:p>
+            <a:pPr algn="ctr"/>
+            <a:r>
+              <a:rPr kumimoji="1" lang="ja-JP" altLang="en-US" dirty="0" smtClean="0">
+                <a:latin typeface="HGPｺﾞｼｯｸE" panose="020B0900000000000000" pitchFamily="50" charset="-128"/>
+                <a:ea typeface="HGPｺﾞｼｯｸE" panose="020B0900000000000000" pitchFamily="50" charset="-128"/>
+              </a:rPr>
+              <a:t>同期型ジョブ</a:t>
+            </a:r>
+            <a:endParaRPr kumimoji="1" lang="en-US" altLang="ja-JP" dirty="0" smtClean="0">
+              <a:latin typeface="HGPｺﾞｼｯｸE" panose="020B0900000000000000" pitchFamily="50" charset="-128"/>
+              <a:ea typeface="HGPｺﾞｼｯｸE" panose="020B0900000000000000" pitchFamily="50" charset="-128"/>
+            </a:endParaRPr>
+          </a:p>
+          <a:p>
+            <a:pPr algn="ctr"/>
+            <a:r>
+              <a:rPr lang="ja-JP" altLang="en-US" dirty="0" smtClean="0">
+                <a:latin typeface="HGPｺﾞｼｯｸE" panose="020B0900000000000000" pitchFamily="50" charset="-128"/>
+                <a:ea typeface="HGPｺﾞｼｯｸE" panose="020B0900000000000000" pitchFamily="50" charset="-128"/>
+              </a:rPr>
+              <a:t>実行</a:t>
+            </a:r>
+            <a:r>
+              <a:rPr lang="ja-JP" altLang="en-US" dirty="0">
+                <a:latin typeface="HGPｺﾞｼｯｸE" panose="020B0900000000000000" pitchFamily="50" charset="-128"/>
+                <a:ea typeface="HGPｺﾞｼｯｸE" panose="020B0900000000000000" pitchFamily="50" charset="-128"/>
+              </a:rPr>
+              <a:t>機能</a:t>
+            </a:r>
+            <a:endParaRPr kumimoji="1" lang="ja-JP" altLang="en-US" dirty="0">
+              <a:latin typeface="HGPｺﾞｼｯｸE" panose="020B0900000000000000" pitchFamily="50" charset="-128"/>
+              <a:ea typeface="HGPｺﾞｼｯｸE" panose="020B0900000000000000" pitchFamily="50" charset="-128"/>
+            </a:endParaRPr>
+          </a:p>
+        </p:txBody>
+      </p:sp>
+      <p:sp>
+        <p:nvSpPr>
+          <p:cNvPr id="21" name="角丸四角形 20"/>
+          <p:cNvSpPr/>
+          <p:nvPr/>
+        </p:nvSpPr>
+        <p:spPr>
+          <a:xfrm>
+            <a:off x="-2105583" y="2566589"/>
+            <a:ext cx="2050906" cy="1299712"/>
+          </a:xfrm>
+          <a:prstGeom prst="roundRect">
+            <a:avLst/>
+          </a:prstGeom>
+          <a:solidFill>
+            <a:srgbClr val="FFC000"/>
+          </a:solidFill>
+          <a:ln w="3175"/>
+        </p:spPr>
+        <p:style>
+          <a:lnRef idx="2">
+            <a:schemeClr val="dk1"/>
+          </a:lnRef>
+          <a:fillRef idx="1">
+            <a:schemeClr val="lt1"/>
+          </a:fillRef>
+          <a:effectRef idx="0">
+            <a:schemeClr val="dk1"/>
+          </a:effectRef>
+          <a:fontRef idx="minor">
+            <a:schemeClr val="dk1"/>
+          </a:fontRef>
+        </p:style>
+        <p:txBody>
+          <a:bodyPr rtlCol="0" anchor="ctr"/>
+          <a:lstStyle/>
+          <a:p>
+            <a:pPr algn="ctr"/>
+            <a:r>
+              <a:rPr kumimoji="1" lang="ja-JP" altLang="en-US" dirty="0" smtClean="0">
+                <a:latin typeface="HGPｺﾞｼｯｸE" panose="020B0900000000000000" pitchFamily="50" charset="-128"/>
+                <a:ea typeface="HGPｺﾞｼｯｸE" panose="020B0900000000000000" pitchFamily="50" charset="-128"/>
+              </a:rPr>
+              <a:t>非同期型ジョブ</a:t>
+            </a:r>
+            <a:endParaRPr kumimoji="1" lang="en-US" altLang="ja-JP" dirty="0" smtClean="0">
+              <a:latin typeface="HGPｺﾞｼｯｸE" panose="020B0900000000000000" pitchFamily="50" charset="-128"/>
+              <a:ea typeface="HGPｺﾞｼｯｸE" panose="020B0900000000000000" pitchFamily="50" charset="-128"/>
+            </a:endParaRPr>
+          </a:p>
+          <a:p>
+            <a:pPr algn="ctr"/>
+            <a:r>
+              <a:rPr lang="ja-JP" altLang="en-US" dirty="0" smtClean="0">
+                <a:latin typeface="HGPｺﾞｼｯｸE" panose="020B0900000000000000" pitchFamily="50" charset="-128"/>
+                <a:ea typeface="HGPｺﾞｼｯｸE" panose="020B0900000000000000" pitchFamily="50" charset="-128"/>
+              </a:rPr>
+              <a:t>実行</a:t>
+            </a:r>
+            <a:r>
+              <a:rPr lang="ja-JP" altLang="en-US" dirty="0">
+                <a:latin typeface="HGPｺﾞｼｯｸE" panose="020B0900000000000000" pitchFamily="50" charset="-128"/>
+                <a:ea typeface="HGPｺﾞｼｯｸE" panose="020B0900000000000000" pitchFamily="50" charset="-128"/>
+              </a:rPr>
+              <a:t>機能</a:t>
+            </a:r>
+            <a:endParaRPr kumimoji="1" lang="ja-JP" altLang="en-US" dirty="0">
+              <a:latin typeface="HGPｺﾞｼｯｸE" panose="020B0900000000000000" pitchFamily="50" charset="-128"/>
+              <a:ea typeface="HGPｺﾞｼｯｸE" panose="020B0900000000000000" pitchFamily="50" charset="-128"/>
+            </a:endParaRPr>
+          </a:p>
+        </p:txBody>
+      </p:sp>
+      <p:sp>
+        <p:nvSpPr>
+          <p:cNvPr id="25" name="角丸四角形 24"/>
+          <p:cNvSpPr/>
+          <p:nvPr/>
+        </p:nvSpPr>
+        <p:spPr>
+          <a:xfrm>
+            <a:off x="8415612" y="1436808"/>
+            <a:ext cx="3020420" cy="447686"/>
+          </a:xfrm>
+          <a:prstGeom prst="roundRect">
+            <a:avLst/>
+          </a:prstGeom>
+          <a:solidFill>
+            <a:schemeClr val="bg1">
+              <a:lumMod val="75000"/>
+            </a:schemeClr>
+          </a:solidFill>
+          <a:ln w="3175">
+            <a:prstDash val="lgDash"/>
+          </a:ln>
+        </p:spPr>
+        <p:style>
+          <a:lnRef idx="2">
+            <a:schemeClr val="dk1"/>
+          </a:lnRef>
+          <a:fillRef idx="1">
+            <a:schemeClr val="lt1"/>
+          </a:fillRef>
+          <a:effectRef idx="0">
+            <a:schemeClr val="dk1"/>
+          </a:effectRef>
+          <a:fontRef idx="minor">
+            <a:schemeClr val="dk1"/>
+          </a:fontRef>
+        </p:style>
+        <p:txBody>
+          <a:bodyPr rtlCol="0" anchor="ctr"/>
+          <a:lstStyle/>
+          <a:p>
+            <a:pPr algn="ctr"/>
+            <a:r>
+              <a:rPr kumimoji="1" lang="en-US" altLang="ja-JP" dirty="0" smtClean="0">
+                <a:latin typeface="HGSｺﾞｼｯｸE" panose="020B0900000000000000" pitchFamily="50" charset="-128"/>
+                <a:ea typeface="HGSｺﾞｼｯｸE" panose="020B0900000000000000" pitchFamily="50" charset="-128"/>
+              </a:rPr>
+              <a:t>DB</a:t>
+            </a:r>
+            <a:r>
+              <a:rPr kumimoji="1" lang="ja-JP" altLang="en-US" dirty="0" smtClean="0">
+                <a:latin typeface="HGSｺﾞｼｯｸE" panose="020B0900000000000000" pitchFamily="50" charset="-128"/>
+                <a:ea typeface="HGSｺﾞｼｯｸE" panose="020B0900000000000000" pitchFamily="50" charset="-128"/>
+              </a:rPr>
+              <a:t>アクセス</a:t>
+            </a:r>
+            <a:endParaRPr kumimoji="1" lang="ja-JP" altLang="en-US" dirty="0">
+              <a:latin typeface="HGSｺﾞｼｯｸE" panose="020B0900000000000000" pitchFamily="50" charset="-128"/>
+              <a:ea typeface="HGSｺﾞｼｯｸE" panose="020B0900000000000000" pitchFamily="50" charset="-128"/>
+            </a:endParaRPr>
+          </a:p>
+        </p:txBody>
+      </p:sp>
+      <p:sp>
+        <p:nvSpPr>
+          <p:cNvPr id="16" name="爆発 1 15"/>
+          <p:cNvSpPr/>
+          <p:nvPr/>
+        </p:nvSpPr>
+        <p:spPr>
+          <a:xfrm>
+            <a:off x="1408170" y="2091433"/>
+            <a:ext cx="6002662" cy="1764820"/>
+          </a:xfrm>
+          <a:prstGeom prst="irregularSeal1">
+            <a:avLst/>
+          </a:prstGeom>
+          <a:solidFill>
+            <a:srgbClr val="FFFF00"/>
+          </a:solidFill>
+          <a:ln w="3175">
+            <a:solidFill>
+              <a:schemeClr val="tx1"/>
+            </a:solidFill>
+          </a:ln>
+        </p:spPr>
+        <p:style>
+          <a:lnRef idx="2">
+            <a:schemeClr val="accent1">
+              <a:shade val="50000"/>
+            </a:schemeClr>
+          </a:lnRef>
+          <a:fillRef idx="1">
+            <a:schemeClr val="accent1"/>
+          </a:fillRef>
+          <a:effectRef idx="0">
+            <a:schemeClr val="accent1"/>
+          </a:effectRef>
+          <a:fontRef idx="minor">
+            <a:schemeClr val="lt1"/>
+          </a:fontRef>
+        </p:style>
+        <p:txBody>
+          <a:bodyPr rtlCol="0" anchor="ctr"/>
+          <a:lstStyle/>
+          <a:p>
+            <a:pPr algn="ctr"/>
+            <a:r>
+              <a:rPr kumimoji="1" lang="ja-JP" altLang="en-US" dirty="0" smtClean="0">
+                <a:solidFill>
+                  <a:sysClr val="windowText" lastClr="000000"/>
+                </a:solidFill>
+                <a:latin typeface="HGPｺﾞｼｯｸE" panose="020B0900000000000000" pitchFamily="50" charset="-128"/>
+                <a:ea typeface="HGPｺﾞｼｯｸE" panose="020B0900000000000000" pitchFamily="50" charset="-128"/>
+              </a:rPr>
+              <a:t>処理フローは</a:t>
+            </a:r>
+            <a:r>
+              <a:rPr kumimoji="1" lang="en-US" altLang="ja-JP" dirty="0" smtClean="0">
+                <a:solidFill>
+                  <a:sysClr val="windowText" lastClr="000000"/>
+                </a:solidFill>
+                <a:latin typeface="HGPｺﾞｼｯｸE" panose="020B0900000000000000" pitchFamily="50" charset="-128"/>
+                <a:ea typeface="HGPｺﾞｼｯｸE" panose="020B0900000000000000" pitchFamily="50" charset="-128"/>
+              </a:rPr>
+              <a:t>FW</a:t>
+            </a:r>
+            <a:r>
+              <a:rPr kumimoji="1" lang="ja-JP" altLang="en-US" dirty="0" smtClean="0">
+                <a:solidFill>
+                  <a:sysClr val="windowText" lastClr="000000"/>
+                </a:solidFill>
+                <a:latin typeface="HGPｺﾞｼｯｸE" panose="020B0900000000000000" pitchFamily="50" charset="-128"/>
+                <a:ea typeface="HGPｺﾞｼｯｸE" panose="020B0900000000000000" pitchFamily="50" charset="-128"/>
+              </a:rPr>
+              <a:t>では</a:t>
+            </a:r>
+            <a:endParaRPr kumimoji="1" lang="en-US" altLang="ja-JP" dirty="0" smtClean="0">
+              <a:solidFill>
+                <a:sysClr val="windowText" lastClr="000000"/>
+              </a:solidFill>
+              <a:latin typeface="HGPｺﾞｼｯｸE" panose="020B0900000000000000" pitchFamily="50" charset="-128"/>
+              <a:ea typeface="HGPｺﾞｼｯｸE" panose="020B0900000000000000" pitchFamily="50" charset="-128"/>
+            </a:endParaRPr>
+          </a:p>
+          <a:p>
+            <a:pPr algn="ctr"/>
+            <a:r>
+              <a:rPr lang="ja-JP" altLang="en-US" dirty="0" smtClean="0">
+                <a:solidFill>
+                  <a:sysClr val="windowText" lastClr="000000"/>
+                </a:solidFill>
+                <a:latin typeface="HGPｺﾞｼｯｸE" panose="020B0900000000000000" pitchFamily="50" charset="-128"/>
+                <a:ea typeface="HGPｺﾞｼｯｸE" panose="020B0900000000000000" pitchFamily="50" charset="-128"/>
+              </a:rPr>
+              <a:t>規定しない。</a:t>
+            </a:r>
+            <a:endParaRPr lang="en-US" altLang="ja-JP" dirty="0" smtClean="0">
+              <a:solidFill>
+                <a:sysClr val="windowText" lastClr="000000"/>
+              </a:solidFill>
+              <a:latin typeface="HGPｺﾞｼｯｸE" panose="020B0900000000000000" pitchFamily="50" charset="-128"/>
+              <a:ea typeface="HGPｺﾞｼｯｸE" panose="020B0900000000000000" pitchFamily="50" charset="-128"/>
+            </a:endParaRPr>
+          </a:p>
+          <a:p>
+            <a:pPr algn="ctr"/>
+            <a:r>
+              <a:rPr kumimoji="1" lang="ja-JP" altLang="en-US" dirty="0" smtClean="0">
+                <a:solidFill>
+                  <a:sysClr val="windowText" lastClr="000000"/>
+                </a:solidFill>
+                <a:latin typeface="HGPｺﾞｼｯｸE" panose="020B0900000000000000" pitchFamily="50" charset="-128"/>
+                <a:ea typeface="HGPｺﾞｼｯｸE" panose="020B0900000000000000" pitchFamily="50" charset="-128"/>
+              </a:rPr>
+              <a:t>開発者がプログラミングする</a:t>
+            </a:r>
+            <a:endParaRPr kumimoji="1" lang="ja-JP" altLang="en-US" dirty="0">
+              <a:solidFill>
+                <a:sysClr val="windowText" lastClr="000000"/>
+              </a:solidFill>
+              <a:latin typeface="HGPｺﾞｼｯｸE" panose="020B0900000000000000" pitchFamily="50" charset="-128"/>
+              <a:ea typeface="HGPｺﾞｼｯｸE" panose="020B0900000000000000" pitchFamily="50" charset="-128"/>
+            </a:endParaRPr>
+          </a:p>
+        </p:txBody>
+      </p:sp>
+      <p:sp>
+        <p:nvSpPr>
+          <p:cNvPr id="27" name="角丸四角形 26"/>
+          <p:cNvSpPr/>
+          <p:nvPr/>
+        </p:nvSpPr>
+        <p:spPr>
+          <a:xfrm>
+            <a:off x="-2155908" y="4812018"/>
+            <a:ext cx="2207812" cy="854070"/>
+          </a:xfrm>
+          <a:prstGeom prst="roundRect">
+            <a:avLst/>
+          </a:prstGeom>
+          <a:solidFill>
+            <a:srgbClr val="FFC000"/>
+          </a:solidFill>
+          <a:ln w="3175"/>
+        </p:spPr>
+        <p:style>
+          <a:lnRef idx="2">
+            <a:schemeClr val="dk1"/>
+          </a:lnRef>
+          <a:fillRef idx="1">
+            <a:schemeClr val="lt1"/>
+          </a:fillRef>
+          <a:effectRef idx="0">
+            <a:schemeClr val="dk1"/>
+          </a:effectRef>
+          <a:fontRef idx="minor">
+            <a:schemeClr val="dk1"/>
+          </a:fontRef>
+        </p:style>
+        <p:txBody>
+          <a:bodyPr rtlCol="0" anchor="ctr"/>
+          <a:lstStyle/>
+          <a:p>
+            <a:pPr algn="ctr"/>
+            <a:r>
+              <a:rPr kumimoji="1" lang="ja-JP" altLang="en-US" dirty="0" smtClean="0">
+                <a:latin typeface="HGPｺﾞｼｯｸE" panose="020B0900000000000000" pitchFamily="50" charset="-128"/>
+                <a:ea typeface="HGPｺﾞｼｯｸE" panose="020B0900000000000000" pitchFamily="50" charset="-128"/>
+              </a:rPr>
+              <a:t>フレームワーク</a:t>
+            </a:r>
+            <a:endParaRPr kumimoji="1" lang="en-US" altLang="ja-JP" dirty="0" smtClean="0">
+              <a:latin typeface="HGPｺﾞｼｯｸE" panose="020B0900000000000000" pitchFamily="50" charset="-128"/>
+              <a:ea typeface="HGPｺﾞｼｯｸE" panose="020B0900000000000000" pitchFamily="50" charset="-128"/>
+            </a:endParaRPr>
+          </a:p>
+          <a:p>
+            <a:pPr algn="ctr"/>
+            <a:r>
+              <a:rPr lang="ja-JP" altLang="en-US" dirty="0" err="1" smtClean="0">
+                <a:latin typeface="HGPｺﾞｼｯｸE" panose="020B0900000000000000" pitchFamily="50" charset="-128"/>
+                <a:ea typeface="HGPｺﾞｼｯｸE" panose="020B0900000000000000" pitchFamily="50" charset="-128"/>
+              </a:rPr>
+              <a:t>が提</a:t>
+            </a:r>
+            <a:r>
+              <a:rPr lang="ja-JP" altLang="en-US" dirty="0" smtClean="0">
+                <a:latin typeface="HGPｺﾞｼｯｸE" panose="020B0900000000000000" pitchFamily="50" charset="-128"/>
+                <a:ea typeface="HGPｺﾞｼｯｸE" panose="020B0900000000000000" pitchFamily="50" charset="-128"/>
+              </a:rPr>
+              <a:t>供する機能</a:t>
+            </a:r>
+            <a:endParaRPr kumimoji="1" lang="ja-JP" altLang="en-US" dirty="0">
+              <a:latin typeface="HGPｺﾞｼｯｸE" panose="020B0900000000000000" pitchFamily="50" charset="-128"/>
+              <a:ea typeface="HGPｺﾞｼｯｸE" panose="020B0900000000000000" pitchFamily="50" charset="-128"/>
+            </a:endParaRPr>
+          </a:p>
+        </p:txBody>
+      </p:sp>
+      <p:sp>
+        <p:nvSpPr>
+          <p:cNvPr id="29" name="角丸四角形 28"/>
+          <p:cNvSpPr/>
+          <p:nvPr/>
+        </p:nvSpPr>
+        <p:spPr>
+          <a:xfrm>
+            <a:off x="-2142104" y="5666088"/>
+            <a:ext cx="2178966" cy="839784"/>
+          </a:xfrm>
+          <a:prstGeom prst="roundRect">
+            <a:avLst/>
+          </a:prstGeom>
+          <a:solidFill>
+            <a:schemeClr val="bg1">
+              <a:lumMod val="75000"/>
+            </a:schemeClr>
+          </a:solidFill>
+          <a:ln w="3175">
+            <a:prstDash val="lgDash"/>
+          </a:ln>
+        </p:spPr>
+        <p:style>
+          <a:lnRef idx="2">
+            <a:schemeClr val="dk1"/>
+          </a:lnRef>
+          <a:fillRef idx="1">
+            <a:schemeClr val="lt1"/>
+          </a:fillRef>
+          <a:effectRef idx="0">
+            <a:schemeClr val="dk1"/>
+          </a:effectRef>
+          <a:fontRef idx="minor">
+            <a:schemeClr val="dk1"/>
+          </a:fontRef>
+        </p:style>
+        <p:txBody>
+          <a:bodyPr rtlCol="0" anchor="ctr"/>
+          <a:lstStyle/>
+          <a:p>
+            <a:pPr algn="ctr"/>
+            <a:r>
+              <a:rPr kumimoji="1" lang="ja-JP" altLang="en-US" dirty="0" smtClean="0">
+                <a:latin typeface="HGPｺﾞｼｯｸE" panose="020B0900000000000000" pitchFamily="50" charset="-128"/>
+                <a:ea typeface="HGPｺﾞｼｯｸE" panose="020B0900000000000000" pitchFamily="50" charset="-128"/>
+              </a:rPr>
+              <a:t>開発者が実装</a:t>
+            </a:r>
+            <a:endParaRPr kumimoji="1" lang="en-US" altLang="ja-JP" dirty="0" smtClean="0">
+              <a:latin typeface="HGPｺﾞｼｯｸE" panose="020B0900000000000000" pitchFamily="50" charset="-128"/>
+              <a:ea typeface="HGPｺﾞｼｯｸE" panose="020B0900000000000000" pitchFamily="50" charset="-128"/>
+            </a:endParaRPr>
+          </a:p>
+          <a:p>
+            <a:pPr algn="ctr"/>
+            <a:r>
+              <a:rPr lang="ja-JP" altLang="en-US" dirty="0" smtClean="0">
+                <a:latin typeface="HGPｺﾞｼｯｸE" panose="020B0900000000000000" pitchFamily="50" charset="-128"/>
+                <a:ea typeface="HGPｺﾞｼｯｸE" panose="020B0900000000000000" pitchFamily="50" charset="-128"/>
+              </a:rPr>
+              <a:t>する部分</a:t>
+            </a:r>
+            <a:endParaRPr kumimoji="1" lang="ja-JP" altLang="en-US" dirty="0">
+              <a:latin typeface="HGPｺﾞｼｯｸE" panose="020B0900000000000000" pitchFamily="50" charset="-128"/>
+              <a:ea typeface="HGPｺﾞｼｯｸE" panose="020B0900000000000000" pitchFamily="50" charset="-128"/>
+            </a:endParaRPr>
+          </a:p>
+        </p:txBody>
+      </p:sp>
+      <p:sp>
+        <p:nvSpPr>
+          <p:cNvPr id="31" name="下矢印 30"/>
+          <p:cNvSpPr/>
+          <p:nvPr/>
+        </p:nvSpPr>
+        <p:spPr>
+          <a:xfrm rot="16200000">
+            <a:off x="7293538" y="915780"/>
+            <a:ext cx="1008200" cy="1210214"/>
+          </a:xfrm>
+          <a:prstGeom prst="downArrow">
+            <a:avLst/>
+          </a:prstGeom>
+          <a:ln w="3175"/>
+        </p:spPr>
+        <p:style>
+          <a:lnRef idx="2">
+            <a:schemeClr val="dk1"/>
+          </a:lnRef>
+          <a:fillRef idx="1">
+            <a:schemeClr val="lt1"/>
+          </a:fillRef>
+          <a:effectRef idx="0">
+            <a:schemeClr val="dk1"/>
+          </a:effectRef>
+          <a:fontRef idx="minor">
+            <a:schemeClr val="dk1"/>
+          </a:fontRef>
+        </p:style>
+        <p:txBody>
+          <a:bodyPr vert="vert" wrap="none" rtlCol="0" anchor="ctr"/>
+          <a:lstStyle/>
+          <a:p>
+            <a:pPr algn="ctr"/>
+            <a:r>
+              <a:rPr lang="ja-JP" altLang="en-US" dirty="0">
+                <a:latin typeface="HGPｺﾞｼｯｸE" panose="020B0900000000000000" pitchFamily="50" charset="-128"/>
+                <a:ea typeface="HGPｺﾞｼｯｸE" panose="020B0900000000000000" pitchFamily="50" charset="-128"/>
+              </a:rPr>
+              <a:t>呼び出し</a:t>
+            </a:r>
+            <a:endParaRPr kumimoji="1" lang="ja-JP" altLang="en-US" dirty="0">
+              <a:latin typeface="HGPｺﾞｼｯｸE" panose="020B0900000000000000" pitchFamily="50" charset="-128"/>
+              <a:ea typeface="HGPｺﾞｼｯｸE" panose="020B0900000000000000" pitchFamily="50" charset="-128"/>
+            </a:endParaRPr>
+          </a:p>
+        </p:txBody>
+      </p:sp>
+    </p:spTree>
+    <p:extLst>
+      <p:ext uri="{BB962C8B-B14F-4D97-AF65-F5344CB8AC3E}">
+        <p14:creationId xmlns:p14="http://schemas.microsoft.com/office/powerpoint/2010/main" val="2363948704"/>
+      </p:ext>
+    </p:extLst>
+  </p:cSld>
+  <p:clrMapOvr>
+    <a:masterClrMapping/>
+  </p:clrMapOvr>
+</p:sld>
+</file>
+
+<file path=ppt/slides/slide2.xml><?xml version="1.0" encoding="utf-8"?>
+<p:sld xmlns:a="http://schemas.openxmlformats.org/drawingml/2006/main" xmlns:r="http://schemas.openxmlformats.org/officeDocument/2006/relationships" xmlns:p="http://schemas.openxmlformats.org/presentationml/2006/main">
+  <p:cSld>
+    <p:spTree>
+      <p:nvGrpSpPr>
+        <p:cNvPr id="1" name=""/>
+        <p:cNvGrpSpPr/>
+        <p:nvPr/>
+      </p:nvGrpSpPr>
+      <p:grpSpPr>
+        <a:xfrm>
+          <a:off x="0" y="0"/>
+          <a:ext cx="0" cy="0"/>
+          <a:chOff x="0" y="0"/>
+          <a:chExt cx="0" cy="0"/>
+        </a:xfrm>
+      </p:grpSpPr>
+      <p:sp>
+        <p:nvSpPr>
+          <p:cNvPr id="2" name="タイトル 1"/>
+          <p:cNvSpPr>
+            <a:spLocks noGrp="1"/>
+          </p:cNvSpPr>
+          <p:nvPr>
+            <p:ph type="title"/>
+          </p:nvPr>
+        </p:nvSpPr>
+        <p:spPr/>
+        <p:txBody>
+          <a:bodyPr/>
+          <a:lstStyle/>
+          <a:p>
+            <a:endParaRPr kumimoji="1" lang="ja-JP" altLang="en-US"/>
+          </a:p>
+        </p:txBody>
+      </p:sp>
+      <p:sp>
+        <p:nvSpPr>
+          <p:cNvPr id="3" name="コンテンツ プレースホルダー 2"/>
+          <p:cNvSpPr>
+            <a:spLocks noGrp="1"/>
+          </p:cNvSpPr>
+          <p:nvPr>
+            <p:ph idx="1"/>
+          </p:nvPr>
+        </p:nvSpPr>
+        <p:spPr/>
+        <p:txBody>
+          <a:bodyPr/>
+          <a:lstStyle/>
+          <a:p>
+            <a:endParaRPr kumimoji="1" lang="ja-JP" altLang="en-US" dirty="0"/>
+          </a:p>
+        </p:txBody>
+      </p:sp>
+      <p:pic>
+        <p:nvPicPr>
+          <p:cNvPr id="4" name="Picture 3" descr="図1"/>
+          <p:cNvPicPr>
+            <a:picLocks noChangeAspect="1" noChangeArrowheads="1"/>
+          </p:cNvPicPr>
+          <p:nvPr/>
+        </p:nvPicPr>
+        <p:blipFill>
+          <a:blip r:embed="rId2" cstate="print">
+            <a:extLst>
+              <a:ext uri="{28A0092B-C50C-407E-A947-70E740481C1C}">
+                <a14:useLocalDpi xmlns:a14="http://schemas.microsoft.com/office/drawing/2010/main" val="0"/>
+              </a:ext>
+            </a:extLst>
+          </a:blip>
+          <a:srcRect/>
+          <a:stretch>
+            <a:fillRect/>
+          </a:stretch>
+        </p:blipFill>
+        <p:spPr bwMode="auto">
+          <a:xfrm>
+            <a:off x="539552" y="692696"/>
+            <a:ext cx="8068521" cy="3850430"/>
+          </a:xfrm>
+          <a:prstGeom prst="rect">
+            <a:avLst/>
+          </a:prstGeom>
+          <a:noFill/>
+          <a:ln>
+            <a:noFill/>
+          </a:ln>
+          <a:extLst>
+            <a:ext uri="{909E8E84-426E-40DD-AFC4-6F175D3DCCD1}">
+              <a14:hiddenFill xmlns:a14="http://schemas.microsoft.com/office/drawing/2010/main">
+                <a:solidFill>
+                  <a:srgbClr val="FFFFFF"/>
+                </a:solidFill>
+              </a14:hiddenFill>
+            </a:ext>
+            <a:ext uri="{91240B29-F687-4F45-9708-019B960494DF}">
+              <a14:hiddenLine xmlns:a14="http://schemas.microsoft.com/office/drawing/2010/main" w="9525">
+                <a:solidFill>
+                  <a:srgbClr val="000000"/>
+                </a:solidFill>
+                <a:miter lim="800000"/>
+                <a:headEnd/>
+                <a:tailEnd/>
+              </a14:hiddenLine>
+            </a:ext>
+          </a:extLst>
+        </p:spPr>
+      </p:pic>
+      <p:pic>
+        <p:nvPicPr>
+          <p:cNvPr id="1026" name="Picture 2"/>
+          <p:cNvPicPr>
+            <a:picLocks noChangeAspect="1" noChangeArrowheads="1"/>
+          </p:cNvPicPr>
+          <p:nvPr/>
+        </p:nvPicPr>
+        <p:blipFill>
+          <a:blip r:embed="rId3">
+            <a:extLst>
+              <a:ext uri="{28A0092B-C50C-407E-A947-70E740481C1C}">
+                <a14:useLocalDpi xmlns:a14="http://schemas.microsoft.com/office/drawing/2010/main" val="0"/>
+              </a:ext>
+            </a:extLst>
+          </a:blip>
+          <a:srcRect/>
+          <a:stretch>
+            <a:fillRect/>
+          </a:stretch>
+        </p:blipFill>
+        <p:spPr bwMode="auto">
+          <a:xfrm>
+            <a:off x="0" y="76200"/>
+            <a:ext cx="14497050" cy="6705600"/>
+          </a:xfrm>
+          <a:prstGeom prst="rect">
+            <a:avLst/>
+          </a:prstGeom>
+          <a:noFill/>
+          <a:ln>
+            <a:noFill/>
+          </a:ln>
+          <a:extLst>
+            <a:ext uri="{909E8E84-426E-40DD-AFC4-6F175D3DCCD1}">
+              <a14:hiddenFill xmlns:a14="http://schemas.microsoft.com/office/drawing/2010/main">
+                <a:solidFill>
+                  <a:schemeClr val="accent1"/>
+                </a:solidFill>
+              </a14:hiddenFill>
+            </a:ext>
+            <a:ext uri="{91240B29-F687-4F45-9708-019B960494DF}">
+              <a14:hiddenLine xmlns:a14="http://schemas.microsoft.com/office/drawing/2010/main" w="9525">
+                <a:solidFill>
+                  <a:schemeClr val="tx1"/>
+                </a:solidFill>
+                <a:miter lim="800000"/>
+                <a:headEnd/>
+                <a:tailEnd/>
+              </a14:hiddenLine>
+            </a:ext>
+          </a:extLst>
+        </p:spPr>
+      </p:pic>
+    </p:spTree>
+    <p:extLst>
+      <p:ext uri="{BB962C8B-B14F-4D97-AF65-F5344CB8AC3E}">
+        <p14:creationId xmlns:p14="http://schemas.microsoft.com/office/powerpoint/2010/main" val="2085931712"/>
+      </p:ext>
+    </p:extLst>
+  </p:cSld>
+  <p:clrMapOvr>
+    <a:masterClrMapping/>
+  </p:clrMapOvr>
+</p:sld>
+</file>
+
+<file path=ppt/slides/slide3.xml><?xml version="1.0" encoding="utf-8"?>
+<p:sld xmlns:a="http://schemas.openxmlformats.org/drawingml/2006/main" xmlns:r="http://schemas.openxmlformats.org/officeDocument/2006/relationships" xmlns:p="http://schemas.openxmlformats.org/presentationml/2006/main">
+  <p:cSld>
+    <p:spTree>
+      <p:nvGrpSpPr>
+        <p:cNvPr id="1" name=""/>
+        <p:cNvGrpSpPr/>
+        <p:nvPr/>
+      </p:nvGrpSpPr>
+      <p:grpSpPr>
+        <a:xfrm>
+          <a:off x="0" y="0"/>
+          <a:ext cx="0" cy="0"/>
+          <a:chOff x="0" y="0"/>
+          <a:chExt cx="0" cy="0"/>
+        </a:xfrm>
+      </p:grpSpPr>
+      <p:sp>
+        <p:nvSpPr>
           <p:cNvPr id="4" name="フローチャート : 磁気ディスク 3"/>
           <p:cNvSpPr/>
           <p:nvPr/>
@@ -6331,7 +7844,7 @@
 </p:sld>
 </file>
 
-<file path=ppt/slides/slide2.xml><?xml version="1.0" encoding="utf-8"?>
+<file path=ppt/slides/slide4.xml><?xml version="1.0" encoding="utf-8"?>
 <p:sld xmlns:a="http://schemas.openxmlformats.org/drawingml/2006/main" xmlns:r="http://schemas.openxmlformats.org/officeDocument/2006/relationships" xmlns:p="http://schemas.openxmlformats.org/presentationml/2006/main">
   <p:cSld>
     <p:spTree>
@@ -8297,7 +9810,7 @@
 </p:sld>
 </file>
 
-<file path=ppt/slides/slide3.xml><?xml version="1.0" encoding="utf-8"?>
+<file path=ppt/slides/slide5.xml><?xml version="1.0" encoding="utf-8"?>
 <p:sld xmlns:a="http://schemas.openxmlformats.org/drawingml/2006/main" xmlns:r="http://schemas.openxmlformats.org/officeDocument/2006/relationships" xmlns:p="http://schemas.openxmlformats.org/presentationml/2006/main">
   <p:cSld>
     <p:spTree>
@@ -10370,7 +11883,7 @@
 </p:sld>
 </file>
 
-<file path=ppt/slides/slide4.xml><?xml version="1.0" encoding="utf-8"?>
+<file path=ppt/slides/slide6.xml><?xml version="1.0" encoding="utf-8"?>
 <p:sld xmlns:a="http://schemas.openxmlformats.org/drawingml/2006/main" xmlns:r="http://schemas.openxmlformats.org/officeDocument/2006/relationships" xmlns:p="http://schemas.openxmlformats.org/presentationml/2006/main">
   <p:cSld>
     <p:spTree>
@@ -12775,7 +14288,7 @@
 </p:sld>
 </file>
 
-<file path=ppt/slides/slide5.xml><?xml version="1.0" encoding="utf-8"?>
+<file path=ppt/slides/slide7.xml><?xml version="1.0" encoding="utf-8"?>
 <p:sld xmlns:a="http://schemas.openxmlformats.org/drawingml/2006/main" xmlns:r="http://schemas.openxmlformats.org/officeDocument/2006/relationships" xmlns:p="http://schemas.openxmlformats.org/presentationml/2006/main">
   <p:cSld>
     <p:spTree>
@@ -15416,7 +16929,7 @@
 </p:sld>
 </file>
 
-<file path=ppt/slides/slide6.xml><?xml version="1.0" encoding="utf-8"?>
+<file path=ppt/slides/slide8.xml><?xml version="1.0" encoding="utf-8"?>
 <p:sld xmlns:a="http://schemas.openxmlformats.org/drawingml/2006/main" xmlns:r="http://schemas.openxmlformats.org/officeDocument/2006/relationships" xmlns:p="http://schemas.openxmlformats.org/presentationml/2006/main">
   <p:cSld>
     <p:spTree>
@@ -17343,11 +18856,7 @@
           <a:p>
             <a:r>
               <a:rPr lang="ja-JP" altLang="en-US" sz="1200" dirty="0" smtClean="0"/>
-              <a:t>第２</a:t>
-            </a:r>
-            <a:r>
-              <a:rPr lang="ja-JP" altLang="en-US" sz="1200" dirty="0" smtClean="0"/>
-              <a:t>ブレイクキー</a:t>
+              <a:t>第２ブレイクキー</a:t>
             </a:r>
             <a:endParaRPr kumimoji="1" lang="ja-JP" altLang="en-US" sz="1200" dirty="0" smtClean="0"/>
           </a:p>
@@ -17456,7 +18965,6 @@
               <a:rPr kumimoji="1" lang="ja-JP" altLang="en-US" sz="1200" dirty="0" smtClean="0"/>
               <a:t>ステップ３</a:t>
             </a:r>
-            <a:endParaRPr kumimoji="1" lang="ja-JP" altLang="en-US" sz="1200" dirty="0" smtClean="0"/>
           </a:p>
         </p:txBody>
       </p:sp>

</xml_diff>

<commit_message>
modified documents against review comments (2/16) #1
</commit_message>
<xml_diff>
--- a/tutorial/素材/figures.pptx
+++ b/tutorial/素材/figures.pptx
@@ -200,7 +200,7 @@
             <a:fld id="{B3B782C2-D702-4F12-82BE-63B4C721254B}" type="datetimeFigureOut">
               <a:rPr kumimoji="1" lang="ja-JP" altLang="en-US" smtClean="0"/>
               <a:pPr/>
-              <a:t>2015/1/5</a:t>
+              <a:t>2015/2/16</a:t>
             </a:fld>
             <a:endParaRPr kumimoji="1" lang="ja-JP" altLang="en-US"/>
           </a:p>
@@ -771,7 +771,7 @@
             <a:fld id="{BD1EE93E-8BFC-4282-90A1-6669D32FBCAB}" type="datetimeFigureOut">
               <a:rPr kumimoji="1" lang="ja-JP" altLang="en-US" smtClean="0"/>
               <a:pPr/>
-              <a:t>2015/1/5</a:t>
+              <a:t>2015/2/16</a:t>
             </a:fld>
             <a:endParaRPr kumimoji="1" lang="ja-JP" altLang="en-US"/>
           </a:p>
@@ -970,7 +970,7 @@
             <a:fld id="{BD1EE93E-8BFC-4282-90A1-6669D32FBCAB}" type="datetimeFigureOut">
               <a:rPr kumimoji="1" lang="ja-JP" altLang="en-US" smtClean="0"/>
               <a:pPr/>
-              <a:t>2015/1/5</a:t>
+              <a:t>2015/2/16</a:t>
             </a:fld>
             <a:endParaRPr kumimoji="1" lang="ja-JP" altLang="en-US"/>
           </a:p>
@@ -1179,7 +1179,7 @@
             <a:fld id="{BD1EE93E-8BFC-4282-90A1-6669D32FBCAB}" type="datetimeFigureOut">
               <a:rPr kumimoji="1" lang="ja-JP" altLang="en-US" smtClean="0"/>
               <a:pPr/>
-              <a:t>2015/1/5</a:t>
+              <a:t>2015/2/16</a:t>
             </a:fld>
             <a:endParaRPr kumimoji="1" lang="ja-JP" altLang="en-US"/>
           </a:p>
@@ -1378,7 +1378,7 @@
             <a:fld id="{BD1EE93E-8BFC-4282-90A1-6669D32FBCAB}" type="datetimeFigureOut">
               <a:rPr kumimoji="1" lang="ja-JP" altLang="en-US" smtClean="0"/>
               <a:pPr/>
-              <a:t>2015/1/5</a:t>
+              <a:t>2015/2/16</a:t>
             </a:fld>
             <a:endParaRPr kumimoji="1" lang="ja-JP" altLang="en-US"/>
           </a:p>
@@ -1621,7 +1621,7 @@
             <a:fld id="{BD1EE93E-8BFC-4282-90A1-6669D32FBCAB}" type="datetimeFigureOut">
               <a:rPr kumimoji="1" lang="ja-JP" altLang="en-US" smtClean="0"/>
               <a:pPr/>
-              <a:t>2015/1/5</a:t>
+              <a:t>2015/2/16</a:t>
             </a:fld>
             <a:endParaRPr kumimoji="1" lang="ja-JP" altLang="en-US"/>
           </a:p>
@@ -1970,7 +1970,7 @@
             <a:fld id="{BD1EE93E-8BFC-4282-90A1-6669D32FBCAB}" type="datetimeFigureOut">
               <a:rPr kumimoji="1" lang="ja-JP" altLang="en-US" smtClean="0"/>
               <a:pPr/>
-              <a:t>2015/1/5</a:t>
+              <a:t>2015/2/16</a:t>
             </a:fld>
             <a:endParaRPr kumimoji="1" lang="ja-JP" altLang="en-US"/>
           </a:p>
@@ -2453,7 +2453,7 @@
             <a:fld id="{BD1EE93E-8BFC-4282-90A1-6669D32FBCAB}" type="datetimeFigureOut">
               <a:rPr kumimoji="1" lang="ja-JP" altLang="en-US" smtClean="0"/>
               <a:pPr/>
-              <a:t>2015/1/5</a:t>
+              <a:t>2015/2/16</a:t>
             </a:fld>
             <a:endParaRPr kumimoji="1" lang="ja-JP" altLang="en-US"/>
           </a:p>
@@ -2568,7 +2568,7 @@
             <a:fld id="{BD1EE93E-8BFC-4282-90A1-6669D32FBCAB}" type="datetimeFigureOut">
               <a:rPr kumimoji="1" lang="ja-JP" altLang="en-US" smtClean="0"/>
               <a:pPr/>
-              <a:t>2015/1/5</a:t>
+              <a:t>2015/2/16</a:t>
             </a:fld>
             <a:endParaRPr kumimoji="1" lang="ja-JP" altLang="en-US"/>
           </a:p>
@@ -2660,7 +2660,7 @@
             <a:fld id="{BD1EE93E-8BFC-4282-90A1-6669D32FBCAB}" type="datetimeFigureOut">
               <a:rPr kumimoji="1" lang="ja-JP" altLang="en-US" smtClean="0"/>
               <a:pPr/>
-              <a:t>2015/1/5</a:t>
+              <a:t>2015/2/16</a:t>
             </a:fld>
             <a:endParaRPr kumimoji="1" lang="ja-JP" altLang="en-US"/>
           </a:p>
@@ -2966,7 +2966,7 @@
             <a:fld id="{BD1EE93E-8BFC-4282-90A1-6669D32FBCAB}" type="datetimeFigureOut">
               <a:rPr kumimoji="1" lang="ja-JP" altLang="en-US" smtClean="0"/>
               <a:pPr/>
-              <a:t>2015/1/5</a:t>
+              <a:t>2015/2/16</a:t>
             </a:fld>
             <a:endParaRPr kumimoji="1" lang="ja-JP" altLang="en-US"/>
           </a:p>
@@ -3216,7 +3216,7 @@
             <a:fld id="{BD1EE93E-8BFC-4282-90A1-6669D32FBCAB}" type="datetimeFigureOut">
               <a:rPr kumimoji="1" lang="ja-JP" altLang="en-US" smtClean="0"/>
               <a:pPr/>
-              <a:t>2015/1/5</a:t>
+              <a:t>2015/2/16</a:t>
             </a:fld>
             <a:endParaRPr kumimoji="1" lang="ja-JP" altLang="en-US"/>
           </a:p>
@@ -3458,7 +3458,7 @@
             <a:fld id="{BD1EE93E-8BFC-4282-90A1-6669D32FBCAB}" type="datetimeFigureOut">
               <a:rPr kumimoji="1" lang="ja-JP" altLang="en-US" smtClean="0"/>
               <a:pPr/>
-              <a:t>2015/1/5</a:t>
+              <a:t>2015/2/16</a:t>
             </a:fld>
             <a:endParaRPr kumimoji="1" lang="ja-JP" altLang="en-US"/>
           </a:p>
@@ -3978,21 +3978,7 @@
                 <a:latin typeface="HGPｺﾞｼｯｸE" panose="020B0900000000000000" pitchFamily="50" charset="-128"/>
                 <a:ea typeface="HGPｺﾞｼｯｸE" panose="020B0900000000000000" pitchFamily="50" charset="-128"/>
               </a:rPr>
-              <a:t>「バッチ機能コンポーネント</a:t>
-            </a:r>
-            <a:r>
-              <a:rPr kumimoji="1" lang="ja-JP" altLang="en-US" sz="2000" dirty="0" smtClean="0">
-                <a:latin typeface="HGPｺﾞｼｯｸE" panose="020B0900000000000000" pitchFamily="50" charset="-128"/>
-                <a:ea typeface="HGPｺﾞｼｯｸE" panose="020B0900000000000000" pitchFamily="50" charset="-128"/>
-              </a:rPr>
-              <a:t>」を</a:t>
-            </a:r>
-            <a:r>
-              <a:rPr kumimoji="1" lang="ja-JP" altLang="en-US" sz="2000" dirty="0" smtClean="0">
-                <a:latin typeface="HGPｺﾞｼｯｸE" panose="020B0900000000000000" pitchFamily="50" charset="-128"/>
-                <a:ea typeface="HGPｺﾞｼｯｸE" panose="020B0900000000000000" pitchFamily="50" charset="-128"/>
-              </a:rPr>
-              <a:t>必要に応じて呼び出す。</a:t>
+              <a:t>「バッチ機能コンポーネント」を必要に応じて呼び出す。</a:t>
             </a:r>
             <a:endParaRPr kumimoji="1" lang="ja-JP" altLang="en-US" sz="2000" dirty="0">
               <a:latin typeface="HGPｺﾞｼｯｸE" panose="020B0900000000000000" pitchFamily="50" charset="-128"/>
@@ -4765,13 +4751,9 @@
             <a:avLst/>
           </a:prstGeom>
           <a:solidFill>
-            <a:schemeClr val="bg1">
-              <a:lumMod val="75000"/>
-            </a:schemeClr>
+            <a:srgbClr val="FFC000"/>
           </a:solidFill>
-          <a:ln w="3175">
-            <a:prstDash val="lgDash"/>
-          </a:ln>
+          <a:ln w="3175"/>
         </p:spPr>
         <p:style>
           <a:lnRef idx="2">
@@ -4793,20 +4775,20 @@
           <a:p>
             <a:pPr algn="ctr"/>
             <a:r>
-              <a:rPr kumimoji="1" lang="en-US" altLang="ja-JP" dirty="0" smtClean="0">
+              <a:rPr lang="en-US" altLang="ja-JP" dirty="0">
                 <a:latin typeface="HGSｺﾞｼｯｸE" panose="020B0900000000000000" pitchFamily="50" charset="-128"/>
                 <a:ea typeface="HGSｺﾞｼｯｸE" panose="020B0900000000000000" pitchFamily="50" charset="-128"/>
               </a:rPr>
               <a:t>DB</a:t>
             </a:r>
             <a:r>
-              <a:rPr kumimoji="1" lang="ja-JP" altLang="en-US" dirty="0" smtClean="0">
+              <a:rPr lang="ja-JP" altLang="en-US" dirty="0">
                 <a:latin typeface="HGSｺﾞｼｯｸE" panose="020B0900000000000000" pitchFamily="50" charset="-128"/>
                 <a:ea typeface="HGSｺﾞｼｯｸE" panose="020B0900000000000000" pitchFamily="50" charset="-128"/>
               </a:rPr>
               <a:t>アクセス</a:t>
             </a:r>
-            <a:endParaRPr kumimoji="1" lang="ja-JP" altLang="en-US" dirty="0">
+            <a:endParaRPr lang="ja-JP" altLang="en-US" dirty="0">
               <a:latin typeface="HGSｺﾞｼｯｸE" panose="020B0900000000000000" pitchFamily="50" charset="-128"/>
               <a:ea typeface="HGSｺﾞｼｯｸE" panose="020B0900000000000000" pitchFamily="50" charset="-128"/>
             </a:endParaRPr>
@@ -5159,54 +5141,16 @@
           <a:chExt cx="0" cy="0"/>
         </a:xfrm>
       </p:grpSpPr>
-      <p:sp>
-        <p:nvSpPr>
-          <p:cNvPr id="2" name="タイトル 1"/>
-          <p:cNvSpPr>
-            <a:spLocks noGrp="1"/>
-          </p:cNvSpPr>
-          <p:nvPr>
-            <p:ph type="title"/>
-          </p:nvPr>
-        </p:nvSpPr>
-        <p:spPr/>
-        <p:txBody>
-          <a:bodyPr/>
-          <a:lstStyle/>
-          <a:p>
-            <a:endParaRPr kumimoji="1" lang="ja-JP" altLang="en-US"/>
-          </a:p>
-        </p:txBody>
-      </p:sp>
-      <p:sp>
-        <p:nvSpPr>
-          <p:cNvPr id="3" name="コンテンツ プレースホルダー 2"/>
-          <p:cNvSpPr>
-            <a:spLocks noGrp="1"/>
-          </p:cNvSpPr>
-          <p:nvPr>
-            <p:ph idx="1"/>
-          </p:nvPr>
-        </p:nvSpPr>
-        <p:spPr/>
-        <p:txBody>
-          <a:bodyPr/>
-          <a:lstStyle/>
-          <a:p>
-            <a:endParaRPr kumimoji="1" lang="ja-JP" altLang="en-US" dirty="0"/>
-          </a:p>
-        </p:txBody>
-      </p:sp>
       <p:pic>
         <p:nvPicPr>
-          <p:cNvPr id="4" name="Picture 3" descr="図1"/>
+          <p:cNvPr id="1027" name="Picture 3"/>
           <p:cNvPicPr>
             <a:picLocks noChangeAspect="1" noChangeArrowheads="1"/>
           </p:cNvPicPr>
           <p:nvPr/>
         </p:nvPicPr>
         <p:blipFill>
-          <a:blip r:embed="rId2" cstate="print">
+          <a:blip r:embed="rId2">
             <a:extLst>
               <a:ext uri="{28A0092B-C50C-407E-A947-70E740481C1C}">
                 <a14:useLocalDpi xmlns:a14="http://schemas.microsoft.com/office/drawing/2010/main" val="0"/>
@@ -5220,62 +5164,8 @@
         </p:blipFill>
         <p:spPr bwMode="auto">
           <a:xfrm>
-            <a:off x="539552" y="692696"/>
-            <a:ext cx="8068521" cy="3850430"/>
-          </a:xfrm>
-          <a:prstGeom prst="rect">
-            <a:avLst/>
-          </a:prstGeom>
-          <a:noFill/>
-          <a:ln>
-            <a:noFill/>
-          </a:ln>
-          <a:extLst>
-            <a:ext uri="{909E8E84-426E-40DD-AFC4-6F175D3DCCD1}">
-              <a14:hiddenFill xmlns:a14="http://schemas.microsoft.com/office/drawing/2010/main">
-                <a:solidFill>
-                  <a:srgbClr val="FFFFFF"/>
-                </a:solidFill>
-              </a14:hiddenFill>
-            </a:ext>
-            <a:ext uri="{91240B29-F687-4F45-9708-019B960494DF}">
-              <a14:hiddenLine xmlns:a14="http://schemas.microsoft.com/office/drawing/2010/main" w="9525">
-                <a:solidFill>
-                  <a:srgbClr val="000000"/>
-                </a:solidFill>
-                <a:miter lim="800000"/>
-                <a:headEnd/>
-                <a:tailEnd/>
-              </a14:hiddenLine>
-            </a:ext>
-          </a:extLst>
-        </p:spPr>
-      </p:pic>
-      <p:pic>
-        <p:nvPicPr>
-          <p:cNvPr id="1026" name="Picture 2"/>
-          <p:cNvPicPr>
-            <a:picLocks noChangeAspect="1" noChangeArrowheads="1"/>
-          </p:cNvPicPr>
-          <p:nvPr/>
-        </p:nvPicPr>
-        <p:blipFill>
-          <a:blip r:embed="rId3">
-            <a:extLst>
-              <a:ext uri="{28A0092B-C50C-407E-A947-70E740481C1C}">
-                <a14:useLocalDpi xmlns:a14="http://schemas.microsoft.com/office/drawing/2010/main" val="0"/>
-              </a:ext>
-            </a:extLst>
-          </a:blip>
-          <a:srcRect/>
-          <a:stretch>
-            <a:fillRect/>
-          </a:stretch>
-        </p:blipFill>
-        <p:spPr bwMode="auto">
-          <a:xfrm>
-            <a:off x="0" y="76200"/>
-            <a:ext cx="14497050" cy="6705600"/>
+            <a:off x="-2605088" y="180975"/>
+            <a:ext cx="14354176" cy="6496050"/>
           </a:xfrm>
           <a:prstGeom prst="rect">
             <a:avLst/>

</xml_diff>

<commit_message>
modified documents against 2/17 review comments
</commit_message>
<xml_diff>
--- a/tutorial/素材/figures.pptx
+++ b/tutorial/素材/figures.pptx
@@ -200,7 +200,7 @@
             <a:fld id="{B3B782C2-D702-4F12-82BE-63B4C721254B}" type="datetimeFigureOut">
               <a:rPr kumimoji="1" lang="ja-JP" altLang="en-US" smtClean="0"/>
               <a:pPr/>
-              <a:t>2015/2/16</a:t>
+              <a:t>2015/2/17</a:t>
             </a:fld>
             <a:endParaRPr kumimoji="1" lang="ja-JP" altLang="en-US"/>
           </a:p>
@@ -771,7 +771,7 @@
             <a:fld id="{BD1EE93E-8BFC-4282-90A1-6669D32FBCAB}" type="datetimeFigureOut">
               <a:rPr kumimoji="1" lang="ja-JP" altLang="en-US" smtClean="0"/>
               <a:pPr/>
-              <a:t>2015/2/16</a:t>
+              <a:t>2015/2/17</a:t>
             </a:fld>
             <a:endParaRPr kumimoji="1" lang="ja-JP" altLang="en-US"/>
           </a:p>
@@ -970,7 +970,7 @@
             <a:fld id="{BD1EE93E-8BFC-4282-90A1-6669D32FBCAB}" type="datetimeFigureOut">
               <a:rPr kumimoji="1" lang="ja-JP" altLang="en-US" smtClean="0"/>
               <a:pPr/>
-              <a:t>2015/2/16</a:t>
+              <a:t>2015/2/17</a:t>
             </a:fld>
             <a:endParaRPr kumimoji="1" lang="ja-JP" altLang="en-US"/>
           </a:p>
@@ -1179,7 +1179,7 @@
             <a:fld id="{BD1EE93E-8BFC-4282-90A1-6669D32FBCAB}" type="datetimeFigureOut">
               <a:rPr kumimoji="1" lang="ja-JP" altLang="en-US" smtClean="0"/>
               <a:pPr/>
-              <a:t>2015/2/16</a:t>
+              <a:t>2015/2/17</a:t>
             </a:fld>
             <a:endParaRPr kumimoji="1" lang="ja-JP" altLang="en-US"/>
           </a:p>
@@ -1378,7 +1378,7 @@
             <a:fld id="{BD1EE93E-8BFC-4282-90A1-6669D32FBCAB}" type="datetimeFigureOut">
               <a:rPr kumimoji="1" lang="ja-JP" altLang="en-US" smtClean="0"/>
               <a:pPr/>
-              <a:t>2015/2/16</a:t>
+              <a:t>2015/2/17</a:t>
             </a:fld>
             <a:endParaRPr kumimoji="1" lang="ja-JP" altLang="en-US"/>
           </a:p>
@@ -1621,7 +1621,7 @@
             <a:fld id="{BD1EE93E-8BFC-4282-90A1-6669D32FBCAB}" type="datetimeFigureOut">
               <a:rPr kumimoji="1" lang="ja-JP" altLang="en-US" smtClean="0"/>
               <a:pPr/>
-              <a:t>2015/2/16</a:t>
+              <a:t>2015/2/17</a:t>
             </a:fld>
             <a:endParaRPr kumimoji="1" lang="ja-JP" altLang="en-US"/>
           </a:p>
@@ -1970,7 +1970,7 @@
             <a:fld id="{BD1EE93E-8BFC-4282-90A1-6669D32FBCAB}" type="datetimeFigureOut">
               <a:rPr kumimoji="1" lang="ja-JP" altLang="en-US" smtClean="0"/>
               <a:pPr/>
-              <a:t>2015/2/16</a:t>
+              <a:t>2015/2/17</a:t>
             </a:fld>
             <a:endParaRPr kumimoji="1" lang="ja-JP" altLang="en-US"/>
           </a:p>
@@ -2453,7 +2453,7 @@
             <a:fld id="{BD1EE93E-8BFC-4282-90A1-6669D32FBCAB}" type="datetimeFigureOut">
               <a:rPr kumimoji="1" lang="ja-JP" altLang="en-US" smtClean="0"/>
               <a:pPr/>
-              <a:t>2015/2/16</a:t>
+              <a:t>2015/2/17</a:t>
             </a:fld>
             <a:endParaRPr kumimoji="1" lang="ja-JP" altLang="en-US"/>
           </a:p>
@@ -2568,7 +2568,7 @@
             <a:fld id="{BD1EE93E-8BFC-4282-90A1-6669D32FBCAB}" type="datetimeFigureOut">
               <a:rPr kumimoji="1" lang="ja-JP" altLang="en-US" smtClean="0"/>
               <a:pPr/>
-              <a:t>2015/2/16</a:t>
+              <a:t>2015/2/17</a:t>
             </a:fld>
             <a:endParaRPr kumimoji="1" lang="ja-JP" altLang="en-US"/>
           </a:p>
@@ -2660,7 +2660,7 @@
             <a:fld id="{BD1EE93E-8BFC-4282-90A1-6669D32FBCAB}" type="datetimeFigureOut">
               <a:rPr kumimoji="1" lang="ja-JP" altLang="en-US" smtClean="0"/>
               <a:pPr/>
-              <a:t>2015/2/16</a:t>
+              <a:t>2015/2/17</a:t>
             </a:fld>
             <a:endParaRPr kumimoji="1" lang="ja-JP" altLang="en-US"/>
           </a:p>
@@ -2966,7 +2966,7 @@
             <a:fld id="{BD1EE93E-8BFC-4282-90A1-6669D32FBCAB}" type="datetimeFigureOut">
               <a:rPr kumimoji="1" lang="ja-JP" altLang="en-US" smtClean="0"/>
               <a:pPr/>
-              <a:t>2015/2/16</a:t>
+              <a:t>2015/2/17</a:t>
             </a:fld>
             <a:endParaRPr kumimoji="1" lang="ja-JP" altLang="en-US"/>
           </a:p>
@@ -3216,7 +3216,7 @@
             <a:fld id="{BD1EE93E-8BFC-4282-90A1-6669D32FBCAB}" type="datetimeFigureOut">
               <a:rPr kumimoji="1" lang="ja-JP" altLang="en-US" smtClean="0"/>
               <a:pPr/>
-              <a:t>2015/2/16</a:t>
+              <a:t>2015/2/17</a:t>
             </a:fld>
             <a:endParaRPr kumimoji="1" lang="ja-JP" altLang="en-US"/>
           </a:p>
@@ -3458,7 +3458,7 @@
             <a:fld id="{BD1EE93E-8BFC-4282-90A1-6669D32FBCAB}" type="datetimeFigureOut">
               <a:rPr kumimoji="1" lang="ja-JP" altLang="en-US" smtClean="0"/>
               <a:pPr/>
-              <a:t>2015/2/16</a:t>
+              <a:t>2015/2/17</a:t>
             </a:fld>
             <a:endParaRPr kumimoji="1" lang="ja-JP" altLang="en-US"/>
           </a:p>
@@ -3872,11 +3872,25 @@
           <a:p>
             <a:pPr algn="ctr"/>
             <a:r>
+              <a:rPr lang="ja-JP" altLang="en-US" sz="2000" dirty="0">
+                <a:latin typeface="HGPｺﾞｼｯｸE" panose="020B0900000000000000" pitchFamily="50" charset="-128"/>
+                <a:ea typeface="HGPｺﾞｼｯｸE" panose="020B0900000000000000" pitchFamily="50" charset="-128"/>
+              </a:rPr>
+              <a:t>ビジネスロジック</a:t>
+            </a:r>
+            <a:r>
               <a:rPr kumimoji="1" lang="ja-JP" altLang="en-US" sz="2000" dirty="0" smtClean="0">
                 <a:latin typeface="HGPｺﾞｼｯｸE" panose="020B0900000000000000" pitchFamily="50" charset="-128"/>
                 <a:ea typeface="HGPｺﾞｼｯｸE" panose="020B0900000000000000" pitchFamily="50" charset="-128"/>
               </a:rPr>
-              <a:t>ジョブ実装クラス</a:t>
+              <a:t>実装</a:t>
+            </a:r>
+            <a:r>
+              <a:rPr kumimoji="1" lang="ja-JP" altLang="en-US" sz="2000" dirty="0" smtClean="0">
+                <a:latin typeface="HGPｺﾞｼｯｸE" panose="020B0900000000000000" pitchFamily="50" charset="-128"/>
+                <a:ea typeface="HGPｺﾞｼｯｸE" panose="020B0900000000000000" pitchFamily="50" charset="-128"/>
+              </a:rPr>
+              <a:t>クラス</a:t>
             </a:r>
             <a:endParaRPr kumimoji="1" lang="en-US" altLang="ja-JP" sz="2000" dirty="0" smtClean="0">
               <a:latin typeface="HGPｺﾞｼｯｸE" panose="020B0900000000000000" pitchFamily="50" charset="-128"/>
@@ -4788,10 +4802,6 @@
               </a:rPr>
               <a:t>アクセス</a:t>
             </a:r>
-            <a:endParaRPr lang="ja-JP" altLang="en-US" dirty="0">
-              <a:latin typeface="HGSｺﾞｼｯｸE" panose="020B0900000000000000" pitchFamily="50" charset="-128"/>
-              <a:ea typeface="HGSｺﾞｼｯｸE" panose="020B0900000000000000" pitchFamily="50" charset="-128"/>
-            </a:endParaRPr>
           </a:p>
         </p:txBody>
       </p:sp>
@@ -5143,7 +5153,7 @@
       </p:grpSpPr>
       <p:pic>
         <p:nvPicPr>
-          <p:cNvPr id="1027" name="Picture 3"/>
+          <p:cNvPr id="1026" name="Picture 2"/>
           <p:cNvPicPr>
             <a:picLocks noChangeAspect="1" noChangeArrowheads="1"/>
           </p:cNvPicPr>
@@ -5164,8 +5174,8 @@
         </p:blipFill>
         <p:spPr bwMode="auto">
           <a:xfrm>
-            <a:off x="-2605088" y="180975"/>
-            <a:ext cx="14354176" cy="6496050"/>
+            <a:off x="-396552" y="180975"/>
+            <a:ext cx="14354175" cy="6496050"/>
           </a:xfrm>
           <a:prstGeom prst="rect">
             <a:avLst/>

</xml_diff>

<commit_message>
fixed tutorial document against some comments #128
</commit_message>
<xml_diff>
--- a/tutorial/素材/figures.pptx
+++ b/tutorial/素材/figures.pptx
@@ -114,6 +114,22 @@
       </a:defRPr>
     </a:lvl9pPr>
   </p:defaultTextStyle>
+  <p:extLst>
+    <p:ext uri="{EFAFB233-063F-42B5-8137-9DF3F51BA10A}">
+      <p15:sldGuideLst xmlns:p15="http://schemas.microsoft.com/office/powerpoint/2012/main">
+        <p15:guide id="1" orient="horz" pos="2160">
+          <p15:clr>
+            <a:srgbClr val="A4A3A4"/>
+          </p15:clr>
+        </p15:guide>
+        <p15:guide id="2" pos="2880">
+          <p15:clr>
+            <a:srgbClr val="A4A3A4"/>
+          </p15:clr>
+        </p15:guide>
+      </p15:sldGuideLst>
+    </p:ext>
+  </p:extLst>
 </p:presentation>
 </file>
 
@@ -200,7 +216,7 @@
             <a:fld id="{B3B782C2-D702-4F12-82BE-63B4C721254B}" type="datetimeFigureOut">
               <a:rPr kumimoji="1" lang="ja-JP" altLang="en-US" smtClean="0"/>
               <a:pPr/>
-              <a:t>2015/2/17</a:t>
+              <a:t>2015/11/12</a:t>
             </a:fld>
             <a:endParaRPr kumimoji="1" lang="ja-JP" altLang="en-US"/>
           </a:p>
@@ -582,6 +598,11 @@
         </p:txBody>
       </p:sp>
     </p:spTree>
+    <p:extLst>
+      <p:ext uri="{BB962C8B-B14F-4D97-AF65-F5344CB8AC3E}">
+        <p14:creationId xmlns:p14="http://schemas.microsoft.com/office/powerpoint/2010/main" val="1563925905"/>
+      </p:ext>
+    </p:extLst>
   </p:cSld>
   <p:clrMapOvr>
     <a:masterClrMapping/>
@@ -771,7 +792,7 @@
             <a:fld id="{BD1EE93E-8BFC-4282-90A1-6669D32FBCAB}" type="datetimeFigureOut">
               <a:rPr kumimoji="1" lang="ja-JP" altLang="en-US" smtClean="0"/>
               <a:pPr/>
-              <a:t>2015/2/17</a:t>
+              <a:t>2015/11/12</a:t>
             </a:fld>
             <a:endParaRPr kumimoji="1" lang="ja-JP" altLang="en-US"/>
           </a:p>
@@ -970,7 +991,7 @@
             <a:fld id="{BD1EE93E-8BFC-4282-90A1-6669D32FBCAB}" type="datetimeFigureOut">
               <a:rPr kumimoji="1" lang="ja-JP" altLang="en-US" smtClean="0"/>
               <a:pPr/>
-              <a:t>2015/2/17</a:t>
+              <a:t>2015/11/12</a:t>
             </a:fld>
             <a:endParaRPr kumimoji="1" lang="ja-JP" altLang="en-US"/>
           </a:p>
@@ -1179,7 +1200,7 @@
             <a:fld id="{BD1EE93E-8BFC-4282-90A1-6669D32FBCAB}" type="datetimeFigureOut">
               <a:rPr kumimoji="1" lang="ja-JP" altLang="en-US" smtClean="0"/>
               <a:pPr/>
-              <a:t>2015/2/17</a:t>
+              <a:t>2015/11/12</a:t>
             </a:fld>
             <a:endParaRPr kumimoji="1" lang="ja-JP" altLang="en-US"/>
           </a:p>
@@ -1378,7 +1399,7 @@
             <a:fld id="{BD1EE93E-8BFC-4282-90A1-6669D32FBCAB}" type="datetimeFigureOut">
               <a:rPr kumimoji="1" lang="ja-JP" altLang="en-US" smtClean="0"/>
               <a:pPr/>
-              <a:t>2015/2/17</a:t>
+              <a:t>2015/11/12</a:t>
             </a:fld>
             <a:endParaRPr kumimoji="1" lang="ja-JP" altLang="en-US"/>
           </a:p>
@@ -1621,7 +1642,7 @@
             <a:fld id="{BD1EE93E-8BFC-4282-90A1-6669D32FBCAB}" type="datetimeFigureOut">
               <a:rPr kumimoji="1" lang="ja-JP" altLang="en-US" smtClean="0"/>
               <a:pPr/>
-              <a:t>2015/2/17</a:t>
+              <a:t>2015/11/12</a:t>
             </a:fld>
             <a:endParaRPr kumimoji="1" lang="ja-JP" altLang="en-US"/>
           </a:p>
@@ -1970,7 +1991,7 @@
             <a:fld id="{BD1EE93E-8BFC-4282-90A1-6669D32FBCAB}" type="datetimeFigureOut">
               <a:rPr kumimoji="1" lang="ja-JP" altLang="en-US" smtClean="0"/>
               <a:pPr/>
-              <a:t>2015/2/17</a:t>
+              <a:t>2015/11/12</a:t>
             </a:fld>
             <a:endParaRPr kumimoji="1" lang="ja-JP" altLang="en-US"/>
           </a:p>
@@ -2453,7 +2474,7 @@
             <a:fld id="{BD1EE93E-8BFC-4282-90A1-6669D32FBCAB}" type="datetimeFigureOut">
               <a:rPr kumimoji="1" lang="ja-JP" altLang="en-US" smtClean="0"/>
               <a:pPr/>
-              <a:t>2015/2/17</a:t>
+              <a:t>2015/11/12</a:t>
             </a:fld>
             <a:endParaRPr kumimoji="1" lang="ja-JP" altLang="en-US"/>
           </a:p>
@@ -2568,7 +2589,7 @@
             <a:fld id="{BD1EE93E-8BFC-4282-90A1-6669D32FBCAB}" type="datetimeFigureOut">
               <a:rPr kumimoji="1" lang="ja-JP" altLang="en-US" smtClean="0"/>
               <a:pPr/>
-              <a:t>2015/2/17</a:t>
+              <a:t>2015/11/12</a:t>
             </a:fld>
             <a:endParaRPr kumimoji="1" lang="ja-JP" altLang="en-US"/>
           </a:p>
@@ -2660,7 +2681,7 @@
             <a:fld id="{BD1EE93E-8BFC-4282-90A1-6669D32FBCAB}" type="datetimeFigureOut">
               <a:rPr kumimoji="1" lang="ja-JP" altLang="en-US" smtClean="0"/>
               <a:pPr/>
-              <a:t>2015/2/17</a:t>
+              <a:t>2015/11/12</a:t>
             </a:fld>
             <a:endParaRPr kumimoji="1" lang="ja-JP" altLang="en-US"/>
           </a:p>
@@ -2966,7 +2987,7 @@
             <a:fld id="{BD1EE93E-8BFC-4282-90A1-6669D32FBCAB}" type="datetimeFigureOut">
               <a:rPr kumimoji="1" lang="ja-JP" altLang="en-US" smtClean="0"/>
               <a:pPr/>
-              <a:t>2015/2/17</a:t>
+              <a:t>2015/11/12</a:t>
             </a:fld>
             <a:endParaRPr kumimoji="1" lang="ja-JP" altLang="en-US"/>
           </a:p>
@@ -3216,7 +3237,7 @@
             <a:fld id="{BD1EE93E-8BFC-4282-90A1-6669D32FBCAB}" type="datetimeFigureOut">
               <a:rPr kumimoji="1" lang="ja-JP" altLang="en-US" smtClean="0"/>
               <a:pPr/>
-              <a:t>2015/2/17</a:t>
+              <a:t>2015/11/12</a:t>
             </a:fld>
             <a:endParaRPr kumimoji="1" lang="ja-JP" altLang="en-US"/>
           </a:p>
@@ -3458,7 +3479,7 @@
             <a:fld id="{BD1EE93E-8BFC-4282-90A1-6669D32FBCAB}" type="datetimeFigureOut">
               <a:rPr kumimoji="1" lang="ja-JP" altLang="en-US" smtClean="0"/>
               <a:pPr/>
-              <a:t>2015/2/17</a:t>
+              <a:t>2015/11/12</a:t>
             </a:fld>
             <a:endParaRPr kumimoji="1" lang="ja-JP" altLang="en-US"/>
           </a:p>
@@ -3883,14 +3904,7 @@
                 <a:latin typeface="HGPｺﾞｼｯｸE" panose="020B0900000000000000" pitchFamily="50" charset="-128"/>
                 <a:ea typeface="HGPｺﾞｼｯｸE" panose="020B0900000000000000" pitchFamily="50" charset="-128"/>
               </a:rPr>
-              <a:t>実装</a:t>
-            </a:r>
-            <a:r>
-              <a:rPr kumimoji="1" lang="ja-JP" altLang="en-US" sz="2000" dirty="0" smtClean="0">
-                <a:latin typeface="HGPｺﾞｼｯｸE" panose="020B0900000000000000" pitchFamily="50" charset="-128"/>
-                <a:ea typeface="HGPｺﾞｼｯｸE" panose="020B0900000000000000" pitchFamily="50" charset="-128"/>
-              </a:rPr>
-              <a:t>クラス</a:t>
+              <a:t>実装クラス</a:t>
             </a:r>
             <a:endParaRPr kumimoji="1" lang="en-US" altLang="ja-JP" sz="2000" dirty="0" smtClean="0">
               <a:latin typeface="HGPｺﾞｼｯｸE" panose="020B0900000000000000" pitchFamily="50" charset="-128"/>
@@ -12380,12 +12394,36 @@
           <a:p>
             <a:pPr algn="ctr"/>
             <a:r>
+              <a:rPr lang="ja-JP" altLang="en-US" dirty="0">
+                <a:solidFill>
+                  <a:schemeClr val="tx1"/>
+                </a:solidFill>
+              </a:rPr>
+              <a:t>入出金区分の</a:t>
+            </a:r>
+            <a:r>
               <a:rPr lang="ja-JP" altLang="en-US" dirty="0" smtClean="0">
                 <a:solidFill>
                   <a:schemeClr val="tx1"/>
                 </a:solidFill>
               </a:rPr>
-              <a:t>入出金データ出力処理</a:t>
+              <a:t>判定</a:t>
+            </a:r>
+            <a:endParaRPr lang="en-US" altLang="ja-JP" dirty="0" smtClean="0">
+              <a:solidFill>
+                <a:schemeClr val="tx1"/>
+              </a:solidFill>
+            </a:endParaRPr>
+          </a:p>
+          <a:p>
+            <a:pPr algn="ctr"/>
+            <a:r>
+              <a:rPr lang="ja-JP" altLang="en-US" dirty="0" smtClean="0">
+                <a:solidFill>
+                  <a:schemeClr val="tx1"/>
+                </a:solidFill>
+              </a:rPr>
+              <a:t>計算処理</a:t>
             </a:r>
             <a:endParaRPr kumimoji="1" lang="ja-JP" altLang="en-US" dirty="0">
               <a:solidFill>
@@ -12442,7 +12480,7 @@
         </p:nvSpPr>
         <p:spPr>
           <a:xfrm>
-            <a:off x="1331640" y="2492896"/>
+            <a:off x="1563260" y="4606778"/>
             <a:ext cx="1714512" cy="792088"/>
           </a:xfrm>
           <a:prstGeom prst="foldedCorner">
@@ -12510,45 +12548,6 @@
           </a:p>
         </p:txBody>
       </p:sp>
-      <p:cxnSp>
-        <p:nvCxnSpPr>
-          <p:cNvPr id="27" name="直線矢印コネクタ 26"/>
-          <p:cNvCxnSpPr>
-            <a:stCxn id="21" idx="1"/>
-            <a:endCxn id="25" idx="3"/>
-          </p:cNvCxnSpPr>
-          <p:nvPr/>
-        </p:nvCxnSpPr>
-        <p:spPr>
-          <a:xfrm flipH="1" flipV="1">
-            <a:off x="3046152" y="2888940"/>
-            <a:ext cx="685122" cy="3135"/>
-          </a:xfrm>
-          <a:prstGeom prst="straightConnector1">
-            <a:avLst/>
-          </a:prstGeom>
-          <a:ln w="25400">
-            <a:solidFill>
-              <a:schemeClr val="tx1"/>
-            </a:solidFill>
-            <a:tailEnd type="arrow" w="lg" len="lg"/>
-          </a:ln>
-        </p:spPr>
-        <p:style>
-          <a:lnRef idx="1">
-            <a:schemeClr val="accent1"/>
-          </a:lnRef>
-          <a:fillRef idx="0">
-            <a:schemeClr val="accent1"/>
-          </a:fillRef>
-          <a:effectRef idx="0">
-            <a:schemeClr val="accent1"/>
-          </a:effectRef>
-          <a:fontRef idx="minor">
-            <a:schemeClr val="tx1"/>
-          </a:fontRef>
-        </p:style>
-      </p:cxnSp>
       <p:cxnSp>
         <p:nvCxnSpPr>
           <p:cNvPr id="30" name="カギ線コネクタ 39"/>
@@ -13417,7 +13416,7 @@
         </p:nvSpPr>
         <p:spPr>
           <a:xfrm>
-            <a:off x="3851920" y="4174730"/>
+            <a:off x="6649402" y="4426913"/>
             <a:ext cx="571504" cy="523220"/>
           </a:xfrm>
           <a:prstGeom prst="rect">
@@ -13909,7 +13908,7 @@
         </p:nvSpPr>
         <p:spPr>
           <a:xfrm>
-            <a:off x="5292080" y="4174730"/>
+            <a:off x="1440160" y="4161792"/>
             <a:ext cx="3995936" cy="369332"/>
           </a:xfrm>
           <a:prstGeom prst="rect">
@@ -14062,7 +14061,7 @@
         </p:nvSpPr>
         <p:spPr>
           <a:xfrm>
-            <a:off x="5220072" y="3310634"/>
+            <a:off x="5292080" y="3549294"/>
             <a:ext cx="4464496" cy="369332"/>
           </a:xfrm>
           <a:prstGeom prst="rect">
@@ -14105,17 +14104,19 @@
           <p:cNvPr id="111" name="カギ線コネクタ 39"/>
           <p:cNvCxnSpPr>
             <a:stCxn id="104" idx="1"/>
-            <a:endCxn id="25" idx="2"/>
+            <a:endCxn id="25" idx="3"/>
           </p:cNvCxnSpPr>
           <p:nvPr/>
         </p:nvCxnSpPr>
         <p:spPr>
-          <a:xfrm rot="10800000">
-            <a:off x="2188896" y="3284985"/>
-            <a:ext cx="1519008" cy="1714703"/>
-          </a:xfrm>
-          <a:prstGeom prst="bentConnector2">
-            <a:avLst/>
+          <a:xfrm rot="10800000" flipV="1">
+            <a:off x="3277772" y="4999686"/>
+            <a:ext cx="430132" cy="3135"/>
+          </a:xfrm>
+          <a:prstGeom prst="bentConnector3">
+            <a:avLst>
+              <a:gd name="adj1" fmla="val 50000"/>
+            </a:avLst>
           </a:prstGeom>
           <a:ln w="25400">
             <a:solidFill>

</xml_diff>